<commit_message>
Adding Toolkit name change
</commit_message>
<xml_diff>
--- a/Presentations/BLC Networking Day 2016/BLCnetworkingDay2016.pptx
+++ b/Presentations/BLC Networking Day 2016/BLCnetworkingDay2016.pptx
@@ -5,12 +5,13 @@
     <p:sldMasterId id="2147483660" r:id="rId1"/>
   </p:sldMasterIdLst>
   <p:notesMasterIdLst>
-    <p:notesMasterId r:id="rId5"/>
+    <p:notesMasterId r:id="rId6"/>
   </p:notesMasterIdLst>
   <p:sldIdLst>
     <p:sldId id="257" r:id="rId2"/>
-    <p:sldId id="258" r:id="rId3"/>
-    <p:sldId id="265" r:id="rId4"/>
+    <p:sldId id="266" r:id="rId3"/>
+    <p:sldId id="258" r:id="rId4"/>
+    <p:sldId id="265" r:id="rId5"/>
   </p:sldIdLst>
   <p:sldSz cx="9144000" cy="6858000" type="screen4x3"/>
   <p:notesSz cx="6858000" cy="9144000"/>
@@ -635,7 +636,95 @@
           <a:p>
             <a:fld id="{F0D14C87-DF6A-634A-AD3D-CAB6EA4C158C}" type="slidenum">
               <a:rPr lang="en-US" smtClean="0"/>
-              <a:t>3</a:t>
+              <a:t>2</a:t>
+            </a:fld>
+            <a:endParaRPr lang="en-US"/>
+          </a:p>
+        </p:txBody>
+      </p:sp>
+    </p:spTree>
+    <p:extLst>
+      <p:ext uri="{BB962C8B-B14F-4D97-AF65-F5344CB8AC3E}">
+        <p14:creationId xmlns:p14="http://schemas.microsoft.com/office/powerpoint/2010/main" val="183585833"/>
+      </p:ext>
+    </p:extLst>
+  </p:cSld>
+  <p:clrMapOvr>
+    <a:masterClrMapping/>
+  </p:clrMapOvr>
+</p:notes>
+</file>
+
+<file path=ppt/notesSlides/notesSlide3.xml><?xml version="1.0" encoding="utf-8"?>
+<p:notes xmlns:a="http://schemas.openxmlformats.org/drawingml/2006/main" xmlns:r="http://schemas.openxmlformats.org/officeDocument/2006/relationships" xmlns:p="http://schemas.openxmlformats.org/presentationml/2006/main">
+  <p:cSld>
+    <p:spTree>
+      <p:nvGrpSpPr>
+        <p:cNvPr id="1" name=""/>
+        <p:cNvGrpSpPr/>
+        <p:nvPr/>
+      </p:nvGrpSpPr>
+      <p:grpSpPr>
+        <a:xfrm>
+          <a:off x="0" y="0"/>
+          <a:ext cx="0" cy="0"/>
+          <a:chOff x="0" y="0"/>
+          <a:chExt cx="0" cy="0"/>
+        </a:xfrm>
+      </p:grpSpPr>
+      <p:sp>
+        <p:nvSpPr>
+          <p:cNvPr id="2" name="Slide Image Placeholder 1"/>
+          <p:cNvSpPr>
+            <a:spLocks noGrp="1" noRot="1" noChangeAspect="1"/>
+          </p:cNvSpPr>
+          <p:nvPr>
+            <p:ph type="sldImg"/>
+          </p:nvPr>
+        </p:nvSpPr>
+        <p:spPr/>
+      </p:sp>
+      <p:sp>
+        <p:nvSpPr>
+          <p:cNvPr id="3" name="Notes Placeholder 2"/>
+          <p:cNvSpPr>
+            <a:spLocks noGrp="1"/>
+          </p:cNvSpPr>
+          <p:nvPr>
+            <p:ph type="body" idx="1"/>
+          </p:nvPr>
+        </p:nvSpPr>
+        <p:spPr/>
+        <p:txBody>
+          <a:bodyPr/>
+          <a:lstStyle/>
+          <a:p>
+            <a:r>
+              <a:rPr lang="en-US" dirty="0" smtClean="0"/>
+              <a:t>Promotional Slide</a:t>
+            </a:r>
+            <a:endParaRPr lang="en-US" dirty="0"/>
+          </a:p>
+        </p:txBody>
+      </p:sp>
+      <p:sp>
+        <p:nvSpPr>
+          <p:cNvPr id="4" name="Slide Number Placeholder 3"/>
+          <p:cNvSpPr>
+            <a:spLocks noGrp="1"/>
+          </p:cNvSpPr>
+          <p:nvPr>
+            <p:ph type="sldNum" sz="quarter" idx="10"/>
+          </p:nvPr>
+        </p:nvSpPr>
+        <p:spPr/>
+        <p:txBody>
+          <a:bodyPr/>
+          <a:lstStyle/>
+          <a:p>
+            <a:fld id="{F0D14C87-DF6A-634A-AD3D-CAB6EA4C158C}" type="slidenum">
+              <a:rPr lang="en-US" smtClean="0"/>
+              <a:t>4</a:t>
             </a:fld>
             <a:endParaRPr lang="en-US"/>
           </a:p>
@@ -3689,13 +3778,6 @@
               </a:rPr>
               <a:t>The DRS Project Toolkit</a:t>
             </a:r>
-            <a:endParaRPr lang="en-US" sz="3600" dirty="0" smtClean="0">
-              <a:solidFill>
-                <a:srgbClr val="26374B"/>
-              </a:solidFill>
-              <a:latin typeface="Gotham Book"/>
-              <a:cs typeface="Gotham Book"/>
-            </a:endParaRPr>
           </a:p>
         </p:txBody>
       </p:sp>
@@ -3797,17 +3879,7 @@
                 <a:latin typeface="Gotham Book"/>
                 <a:cs typeface="Gotham Book"/>
               </a:rPr>
-              <a:t>Northeastern University </a:t>
-            </a:r>
-            <a:r>
-              <a:rPr lang="en-US" sz="1400" dirty="0" smtClean="0">
-                <a:solidFill>
-                  <a:srgbClr val="26374B"/>
-                </a:solidFill>
-                <a:latin typeface="Gotham Book"/>
-                <a:cs typeface="Gotham Book"/>
-              </a:rPr>
-              <a:t>Libraries</a:t>
+              <a:t>Northeastern University Libraries</a:t>
             </a:r>
             <a:endParaRPr lang="en-US" sz="1400" dirty="0">
               <a:solidFill>
@@ -3886,6 +3958,233 @@
           <a:chExt cx="0" cy="0"/>
         </a:xfrm>
       </p:grpSpPr>
+      <p:sp>
+        <p:nvSpPr>
+          <p:cNvPr id="11" name="TextBox 10"/>
+          <p:cNvSpPr txBox="1"/>
+          <p:nvPr/>
+        </p:nvSpPr>
+        <p:spPr>
+          <a:xfrm>
+            <a:off x="-104504" y="5916287"/>
+            <a:ext cx="6218555" cy="941713"/>
+          </a:xfrm>
+          <a:prstGeom prst="rect">
+            <a:avLst/>
+          </a:prstGeom>
+          <a:noFill/>
+          <a:ln>
+            <a:noFill/>
+          </a:ln>
+        </p:spPr>
+        <p:txBody>
+          <a:bodyPr wrap="square" lIns="329104" tIns="164551" rIns="329104" bIns="164551" numCol="1" rtlCol="0" anchor="ctr">
+            <a:spAutoFit/>
+          </a:bodyPr>
+          <a:lstStyle/>
+          <a:p>
+            <a:pPr>
+              <a:lnSpc>
+                <a:spcPct val="110000"/>
+              </a:lnSpc>
+            </a:pPr>
+            <a:r>
+              <a:rPr lang="en-US" sz="3600" smtClean="0">
+                <a:solidFill>
+                  <a:srgbClr val="26374B"/>
+                </a:solidFill>
+                <a:latin typeface="Gotham Book"/>
+                <a:cs typeface="Gotham Book"/>
+              </a:rPr>
+              <a:t>Ceres: Exhibits</a:t>
+            </a:r>
+            <a:endParaRPr lang="en-US" sz="3600" dirty="0" smtClean="0">
+              <a:solidFill>
+                <a:srgbClr val="26374B"/>
+              </a:solidFill>
+              <a:latin typeface="Gotham Book"/>
+              <a:cs typeface="Gotham Book"/>
+            </a:endParaRPr>
+          </a:p>
+        </p:txBody>
+      </p:sp>
+      <p:sp>
+        <p:nvSpPr>
+          <p:cNvPr id="4" name="TextBox 3"/>
+          <p:cNvSpPr txBox="1"/>
+          <p:nvPr/>
+        </p:nvSpPr>
+        <p:spPr>
+          <a:xfrm>
+            <a:off x="9641093" y="3743386"/>
+            <a:ext cx="184666" cy="369332"/>
+          </a:xfrm>
+          <a:prstGeom prst="rect">
+            <a:avLst/>
+          </a:prstGeom>
+          <a:noFill/>
+        </p:spPr>
+        <p:txBody>
+          <a:bodyPr wrap="none" rtlCol="0">
+            <a:spAutoFit/>
+          </a:bodyPr>
+          <a:lstStyle/>
+          <a:p>
+            <a:endParaRPr lang="en-US" dirty="0"/>
+          </a:p>
+        </p:txBody>
+      </p:sp>
+      <p:sp>
+        <p:nvSpPr>
+          <p:cNvPr id="9" name="TextBox 8"/>
+          <p:cNvSpPr txBox="1"/>
+          <p:nvPr/>
+        </p:nvSpPr>
+        <p:spPr>
+          <a:xfrm>
+            <a:off x="5602942" y="5848195"/>
+            <a:ext cx="3772646" cy="1039689"/>
+          </a:xfrm>
+          <a:prstGeom prst="rect">
+            <a:avLst/>
+          </a:prstGeom>
+          <a:noFill/>
+          <a:ln>
+            <a:noFill/>
+          </a:ln>
+        </p:spPr>
+        <p:txBody>
+          <a:bodyPr wrap="square" lIns="329104" tIns="164551" rIns="329104" bIns="164551" numCol="1" rtlCol="0" anchor="ctr">
+            <a:spAutoFit/>
+          </a:bodyPr>
+          <a:lstStyle/>
+          <a:p>
+            <a:pPr algn="r">
+              <a:lnSpc>
+                <a:spcPct val="110000"/>
+              </a:lnSpc>
+            </a:pPr>
+            <a:r>
+              <a:rPr lang="en-US" sz="1400" dirty="0" smtClean="0">
+                <a:solidFill>
+                  <a:srgbClr val="26374B"/>
+                </a:solidFill>
+                <a:latin typeface="Gotham Book"/>
+                <a:cs typeface="Gotham Book"/>
+              </a:rPr>
+              <a:t>Sarah Sweeney</a:t>
+            </a:r>
+          </a:p>
+          <a:p>
+            <a:pPr algn="r">
+              <a:lnSpc>
+                <a:spcPct val="110000"/>
+              </a:lnSpc>
+            </a:pPr>
+            <a:r>
+              <a:rPr lang="en-US" sz="1400" dirty="0" smtClean="0">
+                <a:solidFill>
+                  <a:srgbClr val="26374B"/>
+                </a:solidFill>
+                <a:latin typeface="Gotham Book"/>
+                <a:cs typeface="Gotham Book"/>
+              </a:rPr>
+              <a:t>Digital Repository Manager</a:t>
+            </a:r>
+          </a:p>
+          <a:p>
+            <a:pPr algn="r">
+              <a:lnSpc>
+                <a:spcPct val="110000"/>
+              </a:lnSpc>
+            </a:pPr>
+            <a:r>
+              <a:rPr lang="en-US" sz="1400" dirty="0" smtClean="0">
+                <a:solidFill>
+                  <a:srgbClr val="26374B"/>
+                </a:solidFill>
+                <a:latin typeface="Gotham Book"/>
+                <a:cs typeface="Gotham Book"/>
+              </a:rPr>
+              <a:t>Northeastern University Libraries</a:t>
+            </a:r>
+            <a:endParaRPr lang="en-US" sz="1400" dirty="0">
+              <a:solidFill>
+                <a:srgbClr val="26374B"/>
+              </a:solidFill>
+              <a:latin typeface="Gotham Book"/>
+              <a:cs typeface="Gotham Book"/>
+            </a:endParaRPr>
+          </a:p>
+        </p:txBody>
+      </p:sp>
+      <p:pic>
+        <p:nvPicPr>
+          <p:cNvPr id="2" name="Picture 1"/>
+          <p:cNvPicPr>
+            <a:picLocks noChangeAspect="1"/>
+          </p:cNvPicPr>
+          <p:nvPr/>
+        </p:nvPicPr>
+        <p:blipFill>
+          <a:blip r:embed="rId3">
+            <a:extLst>
+              <a:ext uri="{28A0092B-C50C-407E-A947-70E740481C1C}">
+                <a14:useLocalDpi xmlns:a14="http://schemas.microsoft.com/office/drawing/2010/main" val="0"/>
+              </a:ext>
+            </a:extLst>
+          </a:blip>
+          <a:stretch>
+            <a:fillRect/>
+          </a:stretch>
+        </p:blipFill>
+        <p:spPr>
+          <a:xfrm>
+            <a:off x="1254036" y="240855"/>
+            <a:ext cx="6650699" cy="5591351"/>
+          </a:xfrm>
+          <a:prstGeom prst="rect">
+            <a:avLst/>
+          </a:prstGeom>
+        </p:spPr>
+      </p:pic>
+    </p:spTree>
+    <p:extLst>
+      <p:ext uri="{BB962C8B-B14F-4D97-AF65-F5344CB8AC3E}">
+        <p14:creationId xmlns:p14="http://schemas.microsoft.com/office/powerpoint/2010/main" val="317910567"/>
+      </p:ext>
+    </p:extLst>
+  </p:cSld>
+  <p:clrMapOvr>
+    <a:masterClrMapping/>
+  </p:clrMapOvr>
+  <p:timing>
+    <p:tnLst>
+      <p:par>
+        <p:cTn id="1" dur="indefinite" restart="never" nodeType="tmRoot"/>
+      </p:par>
+    </p:tnLst>
+  </p:timing>
+</p:sld>
+</file>
+
+<file path=ppt/slides/slide3.xml><?xml version="1.0" encoding="utf-8"?>
+<p:sld xmlns:a="http://schemas.openxmlformats.org/drawingml/2006/main" xmlns:r="http://schemas.openxmlformats.org/officeDocument/2006/relationships" xmlns:p="http://schemas.openxmlformats.org/presentationml/2006/main">
+  <p:cSld>
+    <p:spTree>
+      <p:nvGrpSpPr>
+        <p:cNvPr id="1" name=""/>
+        <p:cNvGrpSpPr/>
+        <p:nvPr/>
+      </p:nvGrpSpPr>
+      <p:grpSpPr>
+        <a:xfrm>
+          <a:off x="0" y="0"/>
+          <a:ext cx="0" cy="0"/>
+          <a:chOff x="0" y="0"/>
+          <a:chExt cx="0" cy="0"/>
+        </a:xfrm>
+      </p:grpSpPr>
       <p:pic>
         <p:nvPicPr>
           <p:cNvPr id="15" name="Picture 14"/>
@@ -4056,11 +4355,11 @@
   <p:clrMapOvr>
     <a:masterClrMapping/>
   </p:clrMapOvr>
-  <mc:AlternateContent xmlns:mc="http://schemas.openxmlformats.org/markup-compatibility/2006">
-    <mc:Choice xmlns:p14="http://schemas.microsoft.com/office/powerpoint/2010/main" Requires="p14">
+  <mc:AlternateContent xmlns:mc="http://schemas.openxmlformats.org/markup-compatibility/2006" xmlns:p14="http://schemas.microsoft.com/office/powerpoint/2010/main">
+    <mc:Choice Requires="p14">
       <p:transition p14:dur="0"/>
     </mc:Choice>
-    <mc:Fallback>
+    <mc:Fallback xmlns="">
       <p:transition/>
     </mc:Fallback>
   </mc:AlternateContent>
@@ -4142,7 +4441,7 @@
 </p:sld>
 </file>
 
-<file path=ppt/slides/slide3.xml><?xml version="1.0" encoding="utf-8"?>
+<file path=ppt/slides/slide4.xml><?xml version="1.0" encoding="utf-8"?>
 <p:sld xmlns:a="http://schemas.openxmlformats.org/drawingml/2006/main" xmlns:r="http://schemas.openxmlformats.org/officeDocument/2006/relationships" xmlns:p="http://schemas.openxmlformats.org/presentationml/2006/main">
   <p:cSld>
     <p:spTree>

</xml_diff>

<commit_message>
Reordered slides, added images
</commit_message>
<xml_diff>
--- a/Presentations/BLC Networking Day 2016/BLCnetworkingDay2016.pptx
+++ b/Presentations/BLC Networking Day 2016/BLCnetworkingDay2016.pptx
@@ -5,13 +5,16 @@
     <p:sldMasterId id="2147483660" r:id="rId1"/>
   </p:sldMasterIdLst>
   <p:notesMasterIdLst>
-    <p:notesMasterId r:id="rId6"/>
+    <p:notesMasterId r:id="rId9"/>
   </p:notesMasterIdLst>
   <p:sldIdLst>
     <p:sldId id="257" r:id="rId2"/>
     <p:sldId id="266" r:id="rId3"/>
-    <p:sldId id="258" r:id="rId4"/>
-    <p:sldId id="265" r:id="rId5"/>
+    <p:sldId id="268" r:id="rId4"/>
+    <p:sldId id="267" r:id="rId5"/>
+    <p:sldId id="269" r:id="rId6"/>
+    <p:sldId id="258" r:id="rId7"/>
+    <p:sldId id="265" r:id="rId8"/>
   </p:sldIdLst>
   <p:sldSz cx="9144000" cy="6858000" type="screen4x3"/>
   <p:notesSz cx="6858000" cy="9144000"/>
@@ -113,12 +116,12 @@
   <p:extLst>
     <p:ext uri="{EFAFB233-063F-42B5-8137-9DF3F51BA10A}">
       <p15:sldGuideLst xmlns:p15="http://schemas.microsoft.com/office/powerpoint/2012/main">
-        <p15:guide id="1" orient="horz" pos="2160">
+        <p15:guide id="1" orient="horz" pos="2160" userDrawn="1">
           <p15:clr>
             <a:srgbClr val="A4A3A4"/>
           </p15:clr>
         </p15:guide>
-        <p15:guide id="2" pos="2880">
+        <p15:guide id="2" pos="2904" userDrawn="1">
           <p15:clr>
             <a:srgbClr val="A4A3A4"/>
           </p15:clr>
@@ -211,7 +214,7 @@
           <a:p>
             <a:fld id="{D9ECFEF1-2E88-E646-A99D-93EC0DB2D22C}" type="datetimeFigureOut">
               <a:rPr lang="en-US" smtClean="0"/>
-              <a:t>5/11/16</a:t>
+              <a:t>5/17/16</a:t>
             </a:fld>
             <a:endParaRPr lang="en-US"/>
           </a:p>
@@ -724,7 +727,7 @@
           <a:p>
             <a:fld id="{F0D14C87-DF6A-634A-AD3D-CAB6EA4C158C}" type="slidenum">
               <a:rPr lang="en-US" smtClean="0"/>
-              <a:t>4</a:t>
+              <a:t>7</a:t>
             </a:fld>
             <a:endParaRPr lang="en-US"/>
           </a:p>
@@ -924,7 +927,7 @@
           <a:p>
             <a:fld id="{C952E0D9-C4C6-B144-92E9-4E0D31DDAA26}" type="datetimeFigureOut">
               <a:rPr lang="en-US" smtClean="0"/>
-              <a:t>5/11/16</a:t>
+              <a:t>5/17/16</a:t>
             </a:fld>
             <a:endParaRPr lang="en-US"/>
           </a:p>
@@ -1094,7 +1097,7 @@
           <a:p>
             <a:fld id="{C952E0D9-C4C6-B144-92E9-4E0D31DDAA26}" type="datetimeFigureOut">
               <a:rPr lang="en-US" smtClean="0"/>
-              <a:t>5/11/16</a:t>
+              <a:t>5/17/16</a:t>
             </a:fld>
             <a:endParaRPr lang="en-US"/>
           </a:p>
@@ -1274,7 +1277,7 @@
           <a:p>
             <a:fld id="{C952E0D9-C4C6-B144-92E9-4E0D31DDAA26}" type="datetimeFigureOut">
               <a:rPr lang="en-US" smtClean="0"/>
-              <a:t>5/11/16</a:t>
+              <a:t>5/17/16</a:t>
             </a:fld>
             <a:endParaRPr lang="en-US"/>
           </a:p>
@@ -1444,7 +1447,7 @@
           <a:p>
             <a:fld id="{C952E0D9-C4C6-B144-92E9-4E0D31DDAA26}" type="datetimeFigureOut">
               <a:rPr lang="en-US" smtClean="0"/>
-              <a:t>5/11/16</a:t>
+              <a:t>5/17/16</a:t>
             </a:fld>
             <a:endParaRPr lang="en-US"/>
           </a:p>
@@ -1690,7 +1693,7 @@
           <a:p>
             <a:fld id="{C952E0D9-C4C6-B144-92E9-4E0D31DDAA26}" type="datetimeFigureOut">
               <a:rPr lang="en-US" smtClean="0"/>
-              <a:t>5/11/16</a:t>
+              <a:t>5/17/16</a:t>
             </a:fld>
             <a:endParaRPr lang="en-US"/>
           </a:p>
@@ -1978,7 +1981,7 @@
           <a:p>
             <a:fld id="{C952E0D9-C4C6-B144-92E9-4E0D31DDAA26}" type="datetimeFigureOut">
               <a:rPr lang="en-US" smtClean="0"/>
-              <a:t>5/11/16</a:t>
+              <a:t>5/17/16</a:t>
             </a:fld>
             <a:endParaRPr lang="en-US"/>
           </a:p>
@@ -2400,7 +2403,7 @@
           <a:p>
             <a:fld id="{C952E0D9-C4C6-B144-92E9-4E0D31DDAA26}" type="datetimeFigureOut">
               <a:rPr lang="en-US" smtClean="0"/>
-              <a:t>5/11/16</a:t>
+              <a:t>5/17/16</a:t>
             </a:fld>
             <a:endParaRPr lang="en-US"/>
           </a:p>
@@ -2518,7 +2521,7 @@
           <a:p>
             <a:fld id="{C952E0D9-C4C6-B144-92E9-4E0D31DDAA26}" type="datetimeFigureOut">
               <a:rPr lang="en-US" smtClean="0"/>
-              <a:t>5/11/16</a:t>
+              <a:t>5/17/16</a:t>
             </a:fld>
             <a:endParaRPr lang="en-US"/>
           </a:p>
@@ -2613,7 +2616,7 @@
           <a:p>
             <a:fld id="{C952E0D9-C4C6-B144-92E9-4E0D31DDAA26}" type="datetimeFigureOut">
               <a:rPr lang="en-US" smtClean="0"/>
-              <a:t>5/11/16</a:t>
+              <a:t>5/17/16</a:t>
             </a:fld>
             <a:endParaRPr lang="en-US"/>
           </a:p>
@@ -2890,7 +2893,7 @@
           <a:p>
             <a:fld id="{C952E0D9-C4C6-B144-92E9-4E0D31DDAA26}" type="datetimeFigureOut">
               <a:rPr lang="en-US" smtClean="0"/>
-              <a:t>5/11/16</a:t>
+              <a:t>5/17/16</a:t>
             </a:fld>
             <a:endParaRPr lang="en-US"/>
           </a:p>
@@ -3147,7 +3150,7 @@
           <a:p>
             <a:fld id="{C952E0D9-C4C6-B144-92E9-4E0D31DDAA26}" type="datetimeFigureOut">
               <a:rPr lang="en-US" smtClean="0"/>
-              <a:t>5/11/16</a:t>
+              <a:t>5/17/16</a:t>
             </a:fld>
             <a:endParaRPr lang="en-US"/>
           </a:p>
@@ -3363,7 +3366,7 @@
           <a:p>
             <a:fld id="{C952E0D9-C4C6-B144-92E9-4E0D31DDAA26}" type="datetimeFigureOut">
               <a:rPr lang="en-US" smtClean="0"/>
-              <a:t>5/11/16</a:t>
+              <a:t>5/17/16</a:t>
             </a:fld>
             <a:endParaRPr lang="en-US"/>
           </a:p>
@@ -3919,6 +3922,11 @@
           <a:prstGeom prst="rect">
             <a:avLst/>
           </a:prstGeom>
+          <a:ln w="28575">
+            <a:solidFill>
+              <a:srgbClr val="26374B"/>
+            </a:solidFill>
+          </a:ln>
         </p:spPr>
       </p:pic>
     </p:spTree>
@@ -4146,6 +4154,11 @@
           <a:prstGeom prst="rect">
             <a:avLst/>
           </a:prstGeom>
+          <a:ln w="28575">
+            <a:solidFill>
+              <a:srgbClr val="26374B"/>
+            </a:solidFill>
+          </a:ln>
         </p:spPr>
       </p:pic>
     </p:spTree>
@@ -4169,6 +4182,960 @@
 </file>
 
 <file path=ppt/slides/slide3.xml><?xml version="1.0" encoding="utf-8"?>
+<p:sld xmlns:a="http://schemas.openxmlformats.org/drawingml/2006/main" xmlns:r="http://schemas.openxmlformats.org/officeDocument/2006/relationships" xmlns:p="http://schemas.openxmlformats.org/presentationml/2006/main">
+  <p:cSld>
+    <p:spTree>
+      <p:nvGrpSpPr>
+        <p:cNvPr id="1" name=""/>
+        <p:cNvGrpSpPr/>
+        <p:nvPr/>
+      </p:nvGrpSpPr>
+      <p:grpSpPr>
+        <a:xfrm>
+          <a:off x="0" y="0"/>
+          <a:ext cx="0" cy="0"/>
+          <a:chOff x="0" y="0"/>
+          <a:chExt cx="0" cy="0"/>
+        </a:xfrm>
+      </p:grpSpPr>
+      <p:sp>
+        <p:nvSpPr>
+          <p:cNvPr id="2" name="Title 1"/>
+          <p:cNvSpPr>
+            <a:spLocks noGrp="1"/>
+          </p:cNvSpPr>
+          <p:nvPr>
+            <p:ph type="title"/>
+          </p:nvPr>
+        </p:nvSpPr>
+        <p:spPr/>
+        <p:txBody>
+          <a:bodyPr/>
+          <a:lstStyle/>
+          <a:p>
+            <a:r>
+              <a:rPr lang="en-US" dirty="0" smtClean="0">
+                <a:solidFill>
+                  <a:srgbClr val="26374B"/>
+                </a:solidFill>
+              </a:rPr>
+              <a:t>Toolkit Architecture</a:t>
+            </a:r>
+            <a:endParaRPr lang="en-US" dirty="0">
+              <a:solidFill>
+                <a:srgbClr val="26374B"/>
+              </a:solidFill>
+            </a:endParaRPr>
+          </a:p>
+        </p:txBody>
+      </p:sp>
+      <p:pic>
+        <p:nvPicPr>
+          <p:cNvPr id="4" name="Content Placeholder 3"/>
+          <p:cNvPicPr>
+            <a:picLocks noGrp="1" noChangeAspect="1"/>
+          </p:cNvPicPr>
+          <p:nvPr>
+            <p:ph idx="1"/>
+          </p:nvPr>
+        </p:nvPicPr>
+        <p:blipFill>
+          <a:blip r:embed="rId2">
+            <a:extLst>
+              <a:ext uri="{28A0092B-C50C-407E-A947-70E740481C1C}">
+                <a14:useLocalDpi xmlns:a14="http://schemas.microsoft.com/office/drawing/2010/main" val="0"/>
+              </a:ext>
+            </a:extLst>
+          </a:blip>
+          <a:stretch>
+            <a:fillRect/>
+          </a:stretch>
+        </p:blipFill>
+        <p:spPr>
+          <a:xfrm>
+            <a:off x="1177528" y="1600200"/>
+            <a:ext cx="6788944" cy="4525963"/>
+          </a:xfrm>
+        </p:spPr>
+      </p:pic>
+    </p:spTree>
+    <p:extLst>
+      <p:ext uri="{BB962C8B-B14F-4D97-AF65-F5344CB8AC3E}">
+        <p14:creationId xmlns:p14="http://schemas.microsoft.com/office/powerpoint/2010/main" val="1028853062"/>
+      </p:ext>
+    </p:extLst>
+  </p:cSld>
+  <p:clrMapOvr>
+    <a:masterClrMapping/>
+  </p:clrMapOvr>
+  <p:timing>
+    <p:tnLst>
+      <p:par>
+        <p:cTn id="1" dur="indefinite" restart="never" nodeType="tmRoot"/>
+      </p:par>
+    </p:tnLst>
+  </p:timing>
+</p:sld>
+</file>
+
+<file path=ppt/slides/slide4.xml><?xml version="1.0" encoding="utf-8"?>
+<p:sld xmlns:a="http://schemas.openxmlformats.org/drawingml/2006/main" xmlns:r="http://schemas.openxmlformats.org/officeDocument/2006/relationships" xmlns:p="http://schemas.openxmlformats.org/presentationml/2006/main">
+  <p:cSld>
+    <p:spTree>
+      <p:nvGrpSpPr>
+        <p:cNvPr id="1" name=""/>
+        <p:cNvGrpSpPr/>
+        <p:nvPr/>
+      </p:nvGrpSpPr>
+      <p:grpSpPr>
+        <a:xfrm>
+          <a:off x="0" y="0"/>
+          <a:ext cx="0" cy="0"/>
+          <a:chOff x="0" y="0"/>
+          <a:chExt cx="0" cy="0"/>
+        </a:xfrm>
+      </p:grpSpPr>
+      <p:sp>
+        <p:nvSpPr>
+          <p:cNvPr id="2" name="Title 1"/>
+          <p:cNvSpPr>
+            <a:spLocks noGrp="1"/>
+          </p:cNvSpPr>
+          <p:nvPr>
+            <p:ph type="title"/>
+          </p:nvPr>
+        </p:nvSpPr>
+        <p:spPr/>
+        <p:txBody>
+          <a:bodyPr/>
+          <a:lstStyle/>
+          <a:p>
+            <a:r>
+              <a:rPr lang="en-US" dirty="0" smtClean="0">
+                <a:solidFill>
+                  <a:srgbClr val="26374B"/>
+                </a:solidFill>
+              </a:rPr>
+              <a:t>Toolkit Features</a:t>
+            </a:r>
+            <a:endParaRPr lang="en-US" dirty="0">
+              <a:solidFill>
+                <a:srgbClr val="26374B"/>
+              </a:solidFill>
+            </a:endParaRPr>
+          </a:p>
+        </p:txBody>
+      </p:sp>
+      <p:sp>
+        <p:nvSpPr>
+          <p:cNvPr id="3" name="Content Placeholder 2"/>
+          <p:cNvSpPr>
+            <a:spLocks noGrp="1"/>
+          </p:cNvSpPr>
+          <p:nvPr>
+            <p:ph idx="1"/>
+          </p:nvPr>
+        </p:nvSpPr>
+        <p:spPr/>
+        <p:txBody>
+          <a:bodyPr/>
+          <a:lstStyle/>
+          <a:p>
+            <a:r>
+              <a:rPr lang="en-US" dirty="0" smtClean="0">
+                <a:solidFill>
+                  <a:srgbClr val="26374B"/>
+                </a:solidFill>
+              </a:rPr>
+              <a:t>Faceted searching</a:t>
+            </a:r>
+          </a:p>
+          <a:p>
+            <a:r>
+              <a:rPr lang="en-US" dirty="0" smtClean="0">
+                <a:solidFill>
+                  <a:srgbClr val="26374B"/>
+                </a:solidFill>
+              </a:rPr>
+              <a:t>Collection and file browsing</a:t>
+            </a:r>
+          </a:p>
+          <a:p>
+            <a:r>
+              <a:rPr lang="en-US" dirty="0">
+                <a:solidFill>
+                  <a:srgbClr val="26374B"/>
+                </a:solidFill>
+              </a:rPr>
+              <a:t>F</a:t>
+            </a:r>
+            <a:r>
+              <a:rPr lang="en-US" dirty="0" smtClean="0">
+                <a:solidFill>
+                  <a:srgbClr val="26374B"/>
+                </a:solidFill>
+              </a:rPr>
+              <a:t>ile downloading</a:t>
+            </a:r>
+          </a:p>
+          <a:p>
+            <a:r>
+              <a:rPr lang="en-US" dirty="0" smtClean="0">
+                <a:solidFill>
+                  <a:srgbClr val="26374B"/>
+                </a:solidFill>
+              </a:rPr>
+              <a:t>Galleries</a:t>
+            </a:r>
+          </a:p>
+          <a:p>
+            <a:r>
+              <a:rPr lang="en-US" dirty="0" smtClean="0">
+                <a:solidFill>
+                  <a:srgbClr val="26374B"/>
+                </a:solidFill>
+              </a:rPr>
+              <a:t>Playlists</a:t>
+            </a:r>
+          </a:p>
+          <a:p>
+            <a:r>
+              <a:rPr lang="en-US" dirty="0" smtClean="0">
+                <a:solidFill>
+                  <a:srgbClr val="26374B"/>
+                </a:solidFill>
+              </a:rPr>
+              <a:t>Maps</a:t>
+            </a:r>
+          </a:p>
+          <a:p>
+            <a:r>
+              <a:rPr lang="en-US" dirty="0" smtClean="0">
+                <a:solidFill>
+                  <a:srgbClr val="26374B"/>
+                </a:solidFill>
+              </a:rPr>
+              <a:t>Timelines</a:t>
+            </a:r>
+            <a:endParaRPr lang="en-US" dirty="0">
+              <a:solidFill>
+                <a:srgbClr val="26374B"/>
+              </a:solidFill>
+            </a:endParaRPr>
+          </a:p>
+        </p:txBody>
+      </p:sp>
+    </p:spTree>
+    <p:extLst>
+      <p:ext uri="{BB962C8B-B14F-4D97-AF65-F5344CB8AC3E}">
+        <p14:creationId xmlns:p14="http://schemas.microsoft.com/office/powerpoint/2010/main" val="1240433195"/>
+      </p:ext>
+    </p:extLst>
+  </p:cSld>
+  <p:clrMapOvr>
+    <a:masterClrMapping/>
+  </p:clrMapOvr>
+  <p:timing>
+    <p:tnLst>
+      <p:par>
+        <p:cTn id="1" dur="indefinite" restart="never" nodeType="tmRoot"/>
+      </p:par>
+    </p:tnLst>
+  </p:timing>
+</p:sld>
+</file>
+
+<file path=ppt/slides/slide5.xml><?xml version="1.0" encoding="utf-8"?>
+<p:sld xmlns:a="http://schemas.openxmlformats.org/drawingml/2006/main" xmlns:r="http://schemas.openxmlformats.org/officeDocument/2006/relationships" xmlns:p="http://schemas.openxmlformats.org/presentationml/2006/main">
+  <p:cSld>
+    <p:spTree>
+      <p:nvGrpSpPr>
+        <p:cNvPr id="1" name=""/>
+        <p:cNvGrpSpPr/>
+        <p:nvPr/>
+      </p:nvGrpSpPr>
+      <p:grpSpPr>
+        <a:xfrm>
+          <a:off x="0" y="0"/>
+          <a:ext cx="0" cy="0"/>
+          <a:chOff x="0" y="0"/>
+          <a:chExt cx="0" cy="0"/>
+        </a:xfrm>
+      </p:grpSpPr>
+      <p:sp>
+        <p:nvSpPr>
+          <p:cNvPr id="2" name="Title 1"/>
+          <p:cNvSpPr>
+            <a:spLocks noGrp="1"/>
+          </p:cNvSpPr>
+          <p:nvPr>
+            <p:ph type="title"/>
+          </p:nvPr>
+        </p:nvSpPr>
+        <p:spPr/>
+        <p:txBody>
+          <a:bodyPr/>
+          <a:lstStyle/>
+          <a:p>
+            <a:r>
+              <a:rPr lang="en-US" dirty="0" smtClean="0"/>
+              <a:t>Toolkit Sites</a:t>
+            </a:r>
+            <a:endParaRPr lang="en-US" dirty="0"/>
+          </a:p>
+        </p:txBody>
+      </p:sp>
+      <p:sp>
+        <p:nvSpPr>
+          <p:cNvPr id="3" name="Content Placeholder 2"/>
+          <p:cNvSpPr>
+            <a:spLocks noGrp="1"/>
+          </p:cNvSpPr>
+          <p:nvPr>
+            <p:ph idx="1"/>
+          </p:nvPr>
+        </p:nvSpPr>
+        <p:spPr>
+          <a:xfrm>
+            <a:off x="228600" y="1384300"/>
+            <a:ext cx="8686800" cy="2857500"/>
+          </a:xfrm>
+        </p:spPr>
+        <p:txBody>
+          <a:bodyPr>
+            <a:normAutofit fontScale="85000" lnSpcReduction="20000"/>
+          </a:bodyPr>
+          <a:lstStyle/>
+          <a:p>
+            <a:pPr marL="0" indent="0" algn="ctr">
+              <a:buNone/>
+            </a:pPr>
+            <a:r>
+              <a:rPr lang="en-US" b="1" dirty="0"/>
+              <a:t>Live </a:t>
+            </a:r>
+            <a:r>
+              <a:rPr lang="en-US" b="1" dirty="0" smtClean="0"/>
+              <a:t>Sites</a:t>
+            </a:r>
+            <a:r>
+              <a:rPr lang="en-US" b="1" i="1" dirty="0" smtClean="0">
+                <a:solidFill>
+                  <a:schemeClr val="accent6">
+                    <a:lumMod val="75000"/>
+                  </a:schemeClr>
+                </a:solidFill>
+              </a:rPr>
+              <a:t>: [</a:t>
+            </a:r>
+            <a:r>
+              <a:rPr lang="en-US" b="1" i="1" dirty="0" err="1" smtClean="0">
+                <a:solidFill>
+                  <a:schemeClr val="accent6">
+                    <a:lumMod val="75000"/>
+                  </a:schemeClr>
+                </a:solidFill>
+              </a:rPr>
+              <a:t>bitly</a:t>
+            </a:r>
+            <a:r>
+              <a:rPr lang="en-US" b="1" i="1" dirty="0" smtClean="0">
+                <a:solidFill>
+                  <a:schemeClr val="accent6">
+                    <a:lumMod val="75000"/>
+                  </a:schemeClr>
+                </a:solidFill>
+              </a:rPr>
+              <a:t>/google </a:t>
+            </a:r>
+            <a:r>
+              <a:rPr lang="en-US" b="1" i="1" dirty="0" err="1" smtClean="0">
+                <a:solidFill>
+                  <a:schemeClr val="accent6">
+                    <a:lumMod val="75000"/>
+                  </a:schemeClr>
+                </a:solidFill>
+              </a:rPr>
+              <a:t>url</a:t>
+            </a:r>
+            <a:r>
+              <a:rPr lang="en-US" b="1" i="1" dirty="0" smtClean="0">
+                <a:solidFill>
+                  <a:schemeClr val="accent6">
+                    <a:lumMod val="75000"/>
+                  </a:schemeClr>
+                </a:solidFill>
+              </a:rPr>
+              <a:t>?]</a:t>
+            </a:r>
+          </a:p>
+          <a:p>
+            <a:pPr marL="0" indent="0">
+              <a:buNone/>
+            </a:pPr>
+            <a:r>
+              <a:rPr lang="en-US" dirty="0" smtClean="0"/>
+              <a:t>Interviews </a:t>
+            </a:r>
+            <a:r>
+              <a:rPr lang="en-US" dirty="0"/>
+              <a:t>with Jewish Latin American Writers and </a:t>
+            </a:r>
+            <a:r>
+              <a:rPr lang="en-US" dirty="0" smtClean="0"/>
+              <a:t>Artists</a:t>
+            </a:r>
+          </a:p>
+          <a:p>
+            <a:pPr marL="457200" lvl="1" indent="0">
+              <a:buNone/>
+            </a:pPr>
+            <a:r>
+              <a:rPr lang="en-US" b="1" dirty="0">
+                <a:solidFill>
+                  <a:srgbClr val="236FC7"/>
+                </a:solidFill>
+              </a:rPr>
+              <a:t>http://</a:t>
+            </a:r>
+            <a:r>
+              <a:rPr lang="en-US" b="1" dirty="0" err="1" smtClean="0">
+                <a:solidFill>
+                  <a:srgbClr val="236FC7"/>
+                </a:solidFill>
+              </a:rPr>
+              <a:t>latinjewisharts.northeastern.edu</a:t>
+            </a:r>
+            <a:endParaRPr lang="en-US" b="1" dirty="0" smtClean="0">
+              <a:solidFill>
+                <a:srgbClr val="236FC7"/>
+              </a:solidFill>
+            </a:endParaRPr>
+          </a:p>
+          <a:p>
+            <a:pPr marL="0" indent="0">
+              <a:buNone/>
+            </a:pPr>
+            <a:r>
+              <a:rPr lang="en-US" dirty="0" smtClean="0"/>
+              <a:t>Picturing the World Gallery</a:t>
+            </a:r>
+          </a:p>
+          <a:p>
+            <a:pPr marL="457200" lvl="1" indent="0">
+              <a:buNone/>
+            </a:pPr>
+            <a:r>
+              <a:rPr lang="en-US" b="1" dirty="0">
+                <a:solidFill>
+                  <a:srgbClr val="236FC7"/>
+                </a:solidFill>
+              </a:rPr>
+              <a:t>http://</a:t>
+            </a:r>
+            <a:r>
+              <a:rPr lang="en-US" b="1" dirty="0" err="1">
+                <a:solidFill>
+                  <a:srgbClr val="236FC7"/>
+                </a:solidFill>
+              </a:rPr>
+              <a:t>arader.library.northeastern.edu</a:t>
+            </a:r>
+            <a:r>
+              <a:rPr lang="en-US" b="1" dirty="0">
+                <a:solidFill>
+                  <a:srgbClr val="236FC7"/>
+                </a:solidFill>
+              </a:rPr>
+              <a:t> </a:t>
+            </a:r>
+            <a:endParaRPr lang="en-US" b="1" dirty="0" smtClean="0">
+              <a:solidFill>
+                <a:srgbClr val="236FC7"/>
+              </a:solidFill>
+            </a:endParaRPr>
+          </a:p>
+          <a:p>
+            <a:pPr marL="0" indent="0">
+              <a:buNone/>
+            </a:pPr>
+            <a:r>
+              <a:rPr lang="en-US" dirty="0" smtClean="0"/>
+              <a:t>A </a:t>
+            </a:r>
+            <a:r>
+              <a:rPr lang="en-US" dirty="0"/>
+              <a:t>Proud Past: A History of Boston-</a:t>
+            </a:r>
+            <a:r>
+              <a:rPr lang="en-US" dirty="0" err="1"/>
+              <a:t>Bouvé</a:t>
+            </a:r>
+            <a:r>
+              <a:rPr lang="en-US" dirty="0"/>
+              <a:t> College, </a:t>
+            </a:r>
+            <a:r>
+              <a:rPr lang="en-US" dirty="0" smtClean="0"/>
+              <a:t>1913-1981</a:t>
+            </a:r>
+          </a:p>
+          <a:p>
+            <a:pPr marL="457200" lvl="1" indent="0">
+              <a:buNone/>
+            </a:pPr>
+            <a:r>
+              <a:rPr lang="en-US" b="1" dirty="0">
+                <a:solidFill>
+                  <a:srgbClr val="236FC7"/>
+                </a:solidFill>
+              </a:rPr>
+              <a:t>http://</a:t>
+            </a:r>
+            <a:r>
+              <a:rPr lang="en-US" b="1" dirty="0" err="1" smtClean="0">
+                <a:solidFill>
+                  <a:srgbClr val="236FC7"/>
+                </a:solidFill>
+              </a:rPr>
+              <a:t>aproudpast.library.northeastern.edu</a:t>
+            </a:r>
+            <a:endParaRPr lang="en-US" b="1" dirty="0" smtClean="0">
+              <a:solidFill>
+                <a:srgbClr val="236FC7"/>
+              </a:solidFill>
+            </a:endParaRPr>
+          </a:p>
+        </p:txBody>
+      </p:sp>
+      <p:sp>
+        <p:nvSpPr>
+          <p:cNvPr id="5" name="Content Placeholder 2"/>
+          <p:cNvSpPr txBox="1">
+            <a:spLocks/>
+          </p:cNvSpPr>
+          <p:nvPr/>
+        </p:nvSpPr>
+        <p:spPr>
+          <a:xfrm>
+            <a:off x="182881" y="4380989"/>
+            <a:ext cx="4859383" cy="2240279"/>
+          </a:xfrm>
+          <a:prstGeom prst="rect">
+            <a:avLst/>
+          </a:prstGeom>
+        </p:spPr>
+        <p:txBody>
+          <a:bodyPr vert="horz" lIns="91440" tIns="45720" rIns="91440" bIns="45720" rtlCol="0">
+            <a:noAutofit/>
+          </a:bodyPr>
+          <a:lstStyle>
+            <a:lvl1pPr marL="342900" indent="-342900" algn="l" defTabSz="457200" rtl="0" eaLnBrk="1" latinLnBrk="0" hangingPunct="1">
+              <a:spcBef>
+                <a:spcPct val="20000"/>
+              </a:spcBef>
+              <a:buFont typeface="Arial"/>
+              <a:buChar char="•"/>
+              <a:defRPr sz="3200" kern="1200">
+                <a:solidFill>
+                  <a:schemeClr val="tx1"/>
+                </a:solidFill>
+                <a:latin typeface="+mn-lt"/>
+                <a:ea typeface="+mn-ea"/>
+                <a:cs typeface="+mn-cs"/>
+              </a:defRPr>
+            </a:lvl1pPr>
+            <a:lvl2pPr marL="742950" indent="-285750" algn="l" defTabSz="457200" rtl="0" eaLnBrk="1" latinLnBrk="0" hangingPunct="1">
+              <a:spcBef>
+                <a:spcPct val="20000"/>
+              </a:spcBef>
+              <a:buFont typeface="Arial"/>
+              <a:buChar char="–"/>
+              <a:defRPr sz="2800" kern="1200">
+                <a:solidFill>
+                  <a:schemeClr val="tx1"/>
+                </a:solidFill>
+                <a:latin typeface="+mn-lt"/>
+                <a:ea typeface="+mn-ea"/>
+                <a:cs typeface="+mn-cs"/>
+              </a:defRPr>
+            </a:lvl2pPr>
+            <a:lvl3pPr marL="1143000" indent="-228600" algn="l" defTabSz="457200" rtl="0" eaLnBrk="1" latinLnBrk="0" hangingPunct="1">
+              <a:spcBef>
+                <a:spcPct val="20000"/>
+              </a:spcBef>
+              <a:buFont typeface="Arial"/>
+              <a:buChar char="•"/>
+              <a:defRPr sz="2400" kern="1200">
+                <a:solidFill>
+                  <a:schemeClr val="tx1"/>
+                </a:solidFill>
+                <a:latin typeface="+mn-lt"/>
+                <a:ea typeface="+mn-ea"/>
+                <a:cs typeface="+mn-cs"/>
+              </a:defRPr>
+            </a:lvl3pPr>
+            <a:lvl4pPr marL="1600200" indent="-228600" algn="l" defTabSz="457200" rtl="0" eaLnBrk="1" latinLnBrk="0" hangingPunct="1">
+              <a:spcBef>
+                <a:spcPct val="20000"/>
+              </a:spcBef>
+              <a:buFont typeface="Arial"/>
+              <a:buChar char="–"/>
+              <a:defRPr sz="2000" kern="1200">
+                <a:solidFill>
+                  <a:schemeClr val="tx1"/>
+                </a:solidFill>
+                <a:latin typeface="+mn-lt"/>
+                <a:ea typeface="+mn-ea"/>
+                <a:cs typeface="+mn-cs"/>
+              </a:defRPr>
+            </a:lvl4pPr>
+            <a:lvl5pPr marL="2057400" indent="-228600" algn="l" defTabSz="457200" rtl="0" eaLnBrk="1" latinLnBrk="0" hangingPunct="1">
+              <a:spcBef>
+                <a:spcPct val="20000"/>
+              </a:spcBef>
+              <a:buFont typeface="Arial"/>
+              <a:buChar char="»"/>
+              <a:defRPr sz="2000" kern="1200">
+                <a:solidFill>
+                  <a:schemeClr val="tx1"/>
+                </a:solidFill>
+                <a:latin typeface="+mn-lt"/>
+                <a:ea typeface="+mn-ea"/>
+                <a:cs typeface="+mn-cs"/>
+              </a:defRPr>
+            </a:lvl5pPr>
+            <a:lvl6pPr marL="2514600" indent="-228600" algn="l" defTabSz="457200" rtl="0" eaLnBrk="1" latinLnBrk="0" hangingPunct="1">
+              <a:spcBef>
+                <a:spcPct val="20000"/>
+              </a:spcBef>
+              <a:buFont typeface="Arial"/>
+              <a:buChar char="•"/>
+              <a:defRPr sz="2000" kern="1200">
+                <a:solidFill>
+                  <a:schemeClr val="tx1"/>
+                </a:solidFill>
+                <a:latin typeface="+mn-lt"/>
+                <a:ea typeface="+mn-ea"/>
+                <a:cs typeface="+mn-cs"/>
+              </a:defRPr>
+            </a:lvl6pPr>
+            <a:lvl7pPr marL="2971800" indent="-228600" algn="l" defTabSz="457200" rtl="0" eaLnBrk="1" latinLnBrk="0" hangingPunct="1">
+              <a:spcBef>
+                <a:spcPct val="20000"/>
+              </a:spcBef>
+              <a:buFont typeface="Arial"/>
+              <a:buChar char="•"/>
+              <a:defRPr sz="2000" kern="1200">
+                <a:solidFill>
+                  <a:schemeClr val="tx1"/>
+                </a:solidFill>
+                <a:latin typeface="+mn-lt"/>
+                <a:ea typeface="+mn-ea"/>
+                <a:cs typeface="+mn-cs"/>
+              </a:defRPr>
+            </a:lvl7pPr>
+            <a:lvl8pPr marL="3429000" indent="-228600" algn="l" defTabSz="457200" rtl="0" eaLnBrk="1" latinLnBrk="0" hangingPunct="1">
+              <a:spcBef>
+                <a:spcPct val="20000"/>
+              </a:spcBef>
+              <a:buFont typeface="Arial"/>
+              <a:buChar char="•"/>
+              <a:defRPr sz="2000" kern="1200">
+                <a:solidFill>
+                  <a:schemeClr val="tx1"/>
+                </a:solidFill>
+                <a:latin typeface="+mn-lt"/>
+                <a:ea typeface="+mn-ea"/>
+                <a:cs typeface="+mn-cs"/>
+              </a:defRPr>
+            </a:lvl8pPr>
+            <a:lvl9pPr marL="3886200" indent="-228600" algn="l" defTabSz="457200" rtl="0" eaLnBrk="1" latinLnBrk="0" hangingPunct="1">
+              <a:spcBef>
+                <a:spcPct val="20000"/>
+              </a:spcBef>
+              <a:buFont typeface="Arial"/>
+              <a:buChar char="•"/>
+              <a:defRPr sz="2000" kern="1200">
+                <a:solidFill>
+                  <a:schemeClr val="tx1"/>
+                </a:solidFill>
+                <a:latin typeface="+mn-lt"/>
+                <a:ea typeface="+mn-ea"/>
+                <a:cs typeface="+mn-cs"/>
+              </a:defRPr>
+            </a:lvl9pPr>
+          </a:lstStyle>
+          <a:p>
+            <a:pPr marL="0" indent="0" algn="ctr">
+              <a:buFont typeface="Arial"/>
+              <a:buNone/>
+            </a:pPr>
+            <a:r>
+              <a:rPr lang="en-US" sz="1700" b="1" dirty="0" smtClean="0"/>
+              <a:t>In Development</a:t>
+            </a:r>
+          </a:p>
+          <a:p>
+            <a:r>
+              <a:rPr lang="en-US" sz="1700" dirty="0" smtClean="0"/>
+              <a:t>The Catskills Institute</a:t>
+            </a:r>
+          </a:p>
+          <a:p>
+            <a:r>
+              <a:rPr lang="en-US" sz="1700" dirty="0" smtClean="0"/>
+              <a:t>Holocaust Awareness Week Programming</a:t>
+            </a:r>
+          </a:p>
+          <a:p>
+            <a:r>
+              <a:rPr lang="en-US" sz="1700" dirty="0" smtClean="0"/>
+              <a:t>Spectrum Literary Magazine</a:t>
+            </a:r>
+          </a:p>
+          <a:p>
+            <a:r>
+              <a:rPr lang="en-US" sz="1700" dirty="0" smtClean="0"/>
+              <a:t>DMC Studios Student Work Showcase</a:t>
+            </a:r>
+          </a:p>
+          <a:p>
+            <a:r>
+              <a:rPr lang="en-US" sz="1700" dirty="0" smtClean="0"/>
+              <a:t>United South End Settlements</a:t>
+            </a:r>
+          </a:p>
+        </p:txBody>
+      </p:sp>
+      <p:sp>
+        <p:nvSpPr>
+          <p:cNvPr id="6" name="Content Placeholder 2"/>
+          <p:cNvSpPr txBox="1">
+            <a:spLocks/>
+          </p:cNvSpPr>
+          <p:nvPr/>
+        </p:nvSpPr>
+        <p:spPr>
+          <a:xfrm>
+            <a:off x="4572000" y="4367926"/>
+            <a:ext cx="4598128" cy="2148839"/>
+          </a:xfrm>
+          <a:prstGeom prst="rect">
+            <a:avLst/>
+          </a:prstGeom>
+        </p:spPr>
+        <p:txBody>
+          <a:bodyPr vert="horz" lIns="91440" tIns="45720" rIns="91440" bIns="45720" rtlCol="0">
+            <a:noAutofit/>
+          </a:bodyPr>
+          <a:lstStyle>
+            <a:lvl1pPr marL="342900" indent="-342900" algn="l" defTabSz="457200" rtl="0" eaLnBrk="1" latinLnBrk="0" hangingPunct="1">
+              <a:spcBef>
+                <a:spcPct val="20000"/>
+              </a:spcBef>
+              <a:buFont typeface="Arial"/>
+              <a:buChar char="•"/>
+              <a:defRPr sz="3200" kern="1200">
+                <a:solidFill>
+                  <a:schemeClr val="tx1"/>
+                </a:solidFill>
+                <a:latin typeface="+mn-lt"/>
+                <a:ea typeface="+mn-ea"/>
+                <a:cs typeface="+mn-cs"/>
+              </a:defRPr>
+            </a:lvl1pPr>
+            <a:lvl2pPr marL="742950" indent="-285750" algn="l" defTabSz="457200" rtl="0" eaLnBrk="1" latinLnBrk="0" hangingPunct="1">
+              <a:spcBef>
+                <a:spcPct val="20000"/>
+              </a:spcBef>
+              <a:buFont typeface="Arial"/>
+              <a:buChar char="–"/>
+              <a:defRPr sz="2800" kern="1200">
+                <a:solidFill>
+                  <a:schemeClr val="tx1"/>
+                </a:solidFill>
+                <a:latin typeface="+mn-lt"/>
+                <a:ea typeface="+mn-ea"/>
+                <a:cs typeface="+mn-cs"/>
+              </a:defRPr>
+            </a:lvl2pPr>
+            <a:lvl3pPr marL="1143000" indent="-228600" algn="l" defTabSz="457200" rtl="0" eaLnBrk="1" latinLnBrk="0" hangingPunct="1">
+              <a:spcBef>
+                <a:spcPct val="20000"/>
+              </a:spcBef>
+              <a:buFont typeface="Arial"/>
+              <a:buChar char="•"/>
+              <a:defRPr sz="2400" kern="1200">
+                <a:solidFill>
+                  <a:schemeClr val="tx1"/>
+                </a:solidFill>
+                <a:latin typeface="+mn-lt"/>
+                <a:ea typeface="+mn-ea"/>
+                <a:cs typeface="+mn-cs"/>
+              </a:defRPr>
+            </a:lvl3pPr>
+            <a:lvl4pPr marL="1600200" indent="-228600" algn="l" defTabSz="457200" rtl="0" eaLnBrk="1" latinLnBrk="0" hangingPunct="1">
+              <a:spcBef>
+                <a:spcPct val="20000"/>
+              </a:spcBef>
+              <a:buFont typeface="Arial"/>
+              <a:buChar char="–"/>
+              <a:defRPr sz="2000" kern="1200">
+                <a:solidFill>
+                  <a:schemeClr val="tx1"/>
+                </a:solidFill>
+                <a:latin typeface="+mn-lt"/>
+                <a:ea typeface="+mn-ea"/>
+                <a:cs typeface="+mn-cs"/>
+              </a:defRPr>
+            </a:lvl4pPr>
+            <a:lvl5pPr marL="2057400" indent="-228600" algn="l" defTabSz="457200" rtl="0" eaLnBrk="1" latinLnBrk="0" hangingPunct="1">
+              <a:spcBef>
+                <a:spcPct val="20000"/>
+              </a:spcBef>
+              <a:buFont typeface="Arial"/>
+              <a:buChar char="»"/>
+              <a:defRPr sz="2000" kern="1200">
+                <a:solidFill>
+                  <a:schemeClr val="tx1"/>
+                </a:solidFill>
+                <a:latin typeface="+mn-lt"/>
+                <a:ea typeface="+mn-ea"/>
+                <a:cs typeface="+mn-cs"/>
+              </a:defRPr>
+            </a:lvl5pPr>
+            <a:lvl6pPr marL="2514600" indent="-228600" algn="l" defTabSz="457200" rtl="0" eaLnBrk="1" latinLnBrk="0" hangingPunct="1">
+              <a:spcBef>
+                <a:spcPct val="20000"/>
+              </a:spcBef>
+              <a:buFont typeface="Arial"/>
+              <a:buChar char="•"/>
+              <a:defRPr sz="2000" kern="1200">
+                <a:solidFill>
+                  <a:schemeClr val="tx1"/>
+                </a:solidFill>
+                <a:latin typeface="+mn-lt"/>
+                <a:ea typeface="+mn-ea"/>
+                <a:cs typeface="+mn-cs"/>
+              </a:defRPr>
+            </a:lvl6pPr>
+            <a:lvl7pPr marL="2971800" indent="-228600" algn="l" defTabSz="457200" rtl="0" eaLnBrk="1" latinLnBrk="0" hangingPunct="1">
+              <a:spcBef>
+                <a:spcPct val="20000"/>
+              </a:spcBef>
+              <a:buFont typeface="Arial"/>
+              <a:buChar char="•"/>
+              <a:defRPr sz="2000" kern="1200">
+                <a:solidFill>
+                  <a:schemeClr val="tx1"/>
+                </a:solidFill>
+                <a:latin typeface="+mn-lt"/>
+                <a:ea typeface="+mn-ea"/>
+                <a:cs typeface="+mn-cs"/>
+              </a:defRPr>
+            </a:lvl7pPr>
+            <a:lvl8pPr marL="3429000" indent="-228600" algn="l" defTabSz="457200" rtl="0" eaLnBrk="1" latinLnBrk="0" hangingPunct="1">
+              <a:spcBef>
+                <a:spcPct val="20000"/>
+              </a:spcBef>
+              <a:buFont typeface="Arial"/>
+              <a:buChar char="•"/>
+              <a:defRPr sz="2000" kern="1200">
+                <a:solidFill>
+                  <a:schemeClr val="tx1"/>
+                </a:solidFill>
+                <a:latin typeface="+mn-lt"/>
+                <a:ea typeface="+mn-ea"/>
+                <a:cs typeface="+mn-cs"/>
+              </a:defRPr>
+            </a:lvl8pPr>
+            <a:lvl9pPr marL="3886200" indent="-228600" algn="l" defTabSz="457200" rtl="0" eaLnBrk="1" latinLnBrk="0" hangingPunct="1">
+              <a:spcBef>
+                <a:spcPct val="20000"/>
+              </a:spcBef>
+              <a:buFont typeface="Arial"/>
+              <a:buChar char="•"/>
+              <a:defRPr sz="2000" kern="1200">
+                <a:solidFill>
+                  <a:schemeClr val="tx1"/>
+                </a:solidFill>
+                <a:latin typeface="+mn-lt"/>
+                <a:ea typeface="+mn-ea"/>
+                <a:cs typeface="+mn-cs"/>
+              </a:defRPr>
+            </a:lvl9pPr>
+          </a:lstStyle>
+          <a:p>
+            <a:pPr marL="0" indent="0" algn="ctr">
+              <a:buFont typeface="Arial"/>
+              <a:buNone/>
+            </a:pPr>
+            <a:r>
+              <a:rPr lang="en-US" sz="1700" b="1" dirty="0" smtClean="0"/>
+              <a:t>New Projects Projected for 2016</a:t>
+            </a:r>
+          </a:p>
+          <a:p>
+            <a:r>
+              <a:rPr lang="en-US" sz="1700" dirty="0" smtClean="0"/>
+              <a:t>Dominican Prayer Book</a:t>
+            </a:r>
+          </a:p>
+          <a:p>
+            <a:r>
+              <a:rPr lang="en-US" sz="1700" dirty="0" smtClean="0"/>
+              <a:t>The Civil Rights and Restorative Justice Project</a:t>
+            </a:r>
+          </a:p>
+          <a:p>
+            <a:r>
+              <a:rPr lang="en-US" sz="1700" dirty="0" smtClean="0"/>
+              <a:t>The Early Black Boston Digital Almanac </a:t>
+            </a:r>
+          </a:p>
+          <a:p>
+            <a:r>
+              <a:rPr lang="en-US" sz="1700" dirty="0" smtClean="0"/>
+              <a:t>The Early Caribbean Digital Archive</a:t>
+            </a:r>
+          </a:p>
+          <a:p>
+            <a:r>
+              <a:rPr lang="en-US" sz="1700" dirty="0" smtClean="0"/>
+              <a:t>African American Institute Archives</a:t>
+            </a:r>
+          </a:p>
+          <a:p>
+            <a:r>
+              <a:rPr lang="en-US" sz="1700" dirty="0" smtClean="0"/>
+              <a:t>Thoreau’s Journal Drawings</a:t>
+            </a:r>
+            <a:endParaRPr lang="en-US" sz="1700" dirty="0"/>
+          </a:p>
+        </p:txBody>
+      </p:sp>
+    </p:spTree>
+    <p:extLst>
+      <p:ext uri="{BB962C8B-B14F-4D97-AF65-F5344CB8AC3E}">
+        <p14:creationId xmlns:p14="http://schemas.microsoft.com/office/powerpoint/2010/main" val="185033428"/>
+      </p:ext>
+    </p:extLst>
+  </p:cSld>
+  <p:clrMapOvr>
+    <a:masterClrMapping/>
+  </p:clrMapOvr>
+  <p:timing>
+    <p:tnLst>
+      <p:par>
+        <p:cTn id="1" dur="indefinite" restart="never" nodeType="tmRoot"/>
+      </p:par>
+    </p:tnLst>
+  </p:timing>
+</p:sld>
+</file>
+
+<file path=ppt/slides/slide6.xml><?xml version="1.0" encoding="utf-8"?>
 <p:sld xmlns:a="http://schemas.openxmlformats.org/drawingml/2006/main" xmlns:r="http://schemas.openxmlformats.org/officeDocument/2006/relationships" xmlns:p="http://schemas.openxmlformats.org/presentationml/2006/main">
   <p:cSld>
     <p:spTree>
@@ -4312,14 +5279,16 @@
       </p:sp>
       <p:pic>
         <p:nvPicPr>
-          <p:cNvPr id="16" name="Picture 15"/>
+          <p:cNvPr id="16" name="Picture 15">
+            <a:hlinkClick r:id="rId3"/>
+          </p:cNvPr>
           <p:cNvPicPr>
             <a:picLocks noChangeAspect="1"/>
           </p:cNvPicPr>
           <p:nvPr/>
         </p:nvPicPr>
         <p:blipFill>
-          <a:blip r:embed="rId3">
+          <a:blip r:embed="rId4">
             <a:extLst>
               <a:ext uri="{28A0092B-C50C-407E-A947-70E740481C1C}">
                 <a14:useLocalDpi xmlns:a14="http://schemas.microsoft.com/office/drawing/2010/main" val="0"/>
@@ -4441,7 +5410,7 @@
 </p:sld>
 </file>
 
-<file path=ppt/slides/slide4.xml><?xml version="1.0" encoding="utf-8"?>
+<file path=ppt/slides/slide7.xml><?xml version="1.0" encoding="utf-8"?>
 <p:sld xmlns:a="http://schemas.openxmlformats.org/drawingml/2006/main" xmlns:r="http://schemas.openxmlformats.org/officeDocument/2006/relationships" xmlns:p="http://schemas.openxmlformats.org/presentationml/2006/main">
   <p:cSld>
     <p:spTree>
@@ -4835,7 +5804,7 @@
                   <a:srgbClr val="202F3E"/>
                 </a:solidFill>
               </a:rPr>
-              <a:t>DRS</a:t>
+              <a:t>DSG</a:t>
             </a:r>
           </a:p>
           <a:p>
@@ -5046,24 +6015,40 @@
               <a:buNone/>
             </a:pPr>
             <a:r>
-              <a:rPr lang="en-US" sz="2700" i="1" dirty="0">
-                <a:solidFill>
-                  <a:srgbClr val="202F3E"/>
+              <a:rPr lang="en-US" sz="2700" b="1" i="1" dirty="0">
+                <a:solidFill>
+                  <a:schemeClr val="accent6">
+                    <a:lumMod val="75000"/>
+                  </a:schemeClr>
                 </a:solidFill>
               </a:rPr>
-              <a:t>https://</a:t>
-            </a:r>
-            <a:r>
-              <a:rPr lang="en-US" sz="2700" i="1" dirty="0" err="1" smtClean="0">
-                <a:solidFill>
-                  <a:srgbClr val="202F3E"/>
+              <a:t>https</a:t>
+            </a:r>
+            <a:r>
+              <a:rPr lang="en-US" sz="2700" b="1" i="1" dirty="0" smtClean="0">
+                <a:solidFill>
+                  <a:schemeClr val="accent6">
+                    <a:lumMod val="75000"/>
+                  </a:schemeClr>
                 </a:solidFill>
               </a:rPr>
-              <a:t>repository.library.northeastern.edu</a:t>
-            </a:r>
-            <a:endParaRPr lang="en-US" sz="2700" i="1" dirty="0" smtClean="0">
+              <a:t>://</a:t>
+            </a:r>
+            <a:r>
+              <a:rPr lang="en-US" sz="2700" b="1" i="1" dirty="0" err="1" smtClean="0">
+                <a:solidFill>
+                  <a:schemeClr val="accent6">
+                    <a:lumMod val="75000"/>
+                  </a:schemeClr>
+                </a:solidFill>
+              </a:rPr>
+              <a:t>dsg.northeastern.edu</a:t>
+            </a:r>
+            <a:endParaRPr lang="en-US" sz="2700" b="1" i="1" dirty="0" smtClean="0">
               <a:solidFill>
-                <a:srgbClr val="202F3E"/>
+                <a:schemeClr val="accent6">
+                  <a:lumMod val="75000"/>
+                </a:schemeClr>
               </a:solidFill>
             </a:endParaRPr>
           </a:p>
@@ -5082,42 +6067,35 @@
               <a:buNone/>
             </a:pPr>
             <a:r>
-              <a:rPr lang="en-US" sz="2700" i="1" dirty="0" smtClean="0">
-                <a:solidFill>
-                  <a:srgbClr val="202F3E"/>
+              <a:rPr lang="en-US" sz="2700" b="1" i="1" dirty="0" smtClean="0">
+                <a:solidFill>
+                  <a:schemeClr val="accent6">
+                    <a:lumMod val="75000"/>
+                  </a:schemeClr>
                 </a:solidFill>
               </a:rPr>
-              <a:t>http://</a:t>
-            </a:r>
-            <a:r>
-              <a:rPr lang="en-US" sz="2700" i="1" dirty="0" err="1" smtClean="0">
-                <a:solidFill>
-                  <a:srgbClr val="202F3E"/>
+              <a:t>[toolkit </a:t>
+            </a:r>
+            <a:r>
+              <a:rPr lang="en-US" sz="2700" b="1" i="1" dirty="0" err="1" smtClean="0">
+                <a:solidFill>
+                  <a:schemeClr val="accent6">
+                    <a:lumMod val="75000"/>
+                  </a:schemeClr>
                 </a:solidFill>
               </a:rPr>
-              <a:t>dsg.neu.edu</a:t>
-            </a:r>
-            <a:r>
-              <a:rPr lang="en-US" sz="2700" i="1" dirty="0" smtClean="0">
-                <a:solidFill>
-                  <a:srgbClr val="202F3E"/>
+              <a:t>url</a:t>
+            </a:r>
+            <a:r>
+              <a:rPr lang="en-US" sz="2700" b="1" i="1" dirty="0" smtClean="0">
+                <a:solidFill>
+                  <a:schemeClr val="accent6">
+                    <a:lumMod val="75000"/>
+                  </a:schemeClr>
                 </a:solidFill>
               </a:rPr>
-              <a:t>/resources/</a:t>
-            </a:r>
-            <a:r>
-              <a:rPr lang="en-US" sz="2700" i="1" dirty="0" err="1" smtClean="0">
-                <a:solidFill>
-                  <a:srgbClr val="202F3E"/>
-                </a:solidFill>
-              </a:rPr>
-              <a:t>drs</a:t>
-            </a:r>
-            <a:endParaRPr lang="en-US" sz="2700" i="1" dirty="0" smtClean="0">
-              <a:solidFill>
-                <a:srgbClr val="202F3E"/>
-              </a:solidFill>
-            </a:endParaRPr>
+              <a:t>]</a:t>
+            </a:r>
           </a:p>
           <a:p>
             <a:pPr marL="0" indent="0">
@@ -5136,7 +6114,7 @@
             <a:r>
               <a:rPr lang="en-US" sz="2700" i="1" dirty="0" err="1" smtClean="0">
                 <a:solidFill>
-                  <a:srgbClr val="202F3E"/>
+                  <a:srgbClr val="26374B"/>
                 </a:solidFill>
               </a:rPr>
               <a:t>sj.sweeney@</a:t>
@@ -5144,14 +6122,14 @@
             <a:r>
               <a:rPr lang="en-US" sz="2700" i="1" dirty="0" err="1">
                 <a:solidFill>
-                  <a:srgbClr val="202F3E"/>
+                  <a:srgbClr val="26374B"/>
                 </a:solidFill>
               </a:rPr>
               <a:t>neu.edu</a:t>
             </a:r>
             <a:endParaRPr lang="en-US" sz="2700" i="1" dirty="0">
               <a:solidFill>
-                <a:srgbClr val="202F3E"/>
+                <a:srgbClr val="26374B"/>
               </a:solidFill>
             </a:endParaRPr>
           </a:p>

</xml_diff>

<commit_message>
Adding shell for OR poster presentation
</commit_message>
<xml_diff>
--- a/Presentations/BLC Networking Day 2016/BLCnetworkingDay2016.pptx
+++ b/Presentations/BLC Networking Day 2016/BLCnetworkingDay2016.pptx
@@ -5,16 +5,21 @@
     <p:sldMasterId id="2147483660" r:id="rId1"/>
   </p:sldMasterIdLst>
   <p:notesMasterIdLst>
-    <p:notesMasterId r:id="rId9"/>
+    <p:notesMasterId r:id="rId14"/>
   </p:notesMasterIdLst>
   <p:sldIdLst>
     <p:sldId id="257" r:id="rId2"/>
     <p:sldId id="266" r:id="rId3"/>
     <p:sldId id="268" r:id="rId4"/>
     <p:sldId id="267" r:id="rId5"/>
-    <p:sldId id="269" r:id="rId6"/>
-    <p:sldId id="258" r:id="rId7"/>
-    <p:sldId id="265" r:id="rId8"/>
+    <p:sldId id="258" r:id="rId6"/>
+    <p:sldId id="270" r:id="rId7"/>
+    <p:sldId id="271" r:id="rId8"/>
+    <p:sldId id="272" r:id="rId9"/>
+    <p:sldId id="273" r:id="rId10"/>
+    <p:sldId id="274" r:id="rId11"/>
+    <p:sldId id="269" r:id="rId12"/>
+    <p:sldId id="265" r:id="rId13"/>
   </p:sldIdLst>
   <p:sldSz cx="9144000" cy="6858000" type="screen4x3"/>
   <p:notesSz cx="6858000" cy="9144000"/>
@@ -727,7 +732,7 @@
           <a:p>
             <a:fld id="{F0D14C87-DF6A-634A-AD3D-CAB6EA4C158C}" type="slidenum">
               <a:rPr lang="en-US" smtClean="0"/>
-              <a:t>7</a:t>
+              <a:t>12</a:t>
             </a:fld>
             <a:endParaRPr lang="en-US"/>
           </a:p>
@@ -3949,6 +3954,1487 @@
 </p:sld>
 </file>
 
+<file path=ppt/slides/slide10.xml><?xml version="1.0" encoding="utf-8"?>
+<p:sld xmlns:a="http://schemas.openxmlformats.org/drawingml/2006/main" xmlns:r="http://schemas.openxmlformats.org/officeDocument/2006/relationships" xmlns:p="http://schemas.openxmlformats.org/presentationml/2006/main">
+  <p:cSld>
+    <p:spTree>
+      <p:nvGrpSpPr>
+        <p:cNvPr id="1" name=""/>
+        <p:cNvGrpSpPr/>
+        <p:nvPr/>
+      </p:nvGrpSpPr>
+      <p:grpSpPr>
+        <a:xfrm>
+          <a:off x="0" y="0"/>
+          <a:ext cx="0" cy="0"/>
+          <a:chOff x="0" y="0"/>
+          <a:chExt cx="0" cy="0"/>
+        </a:xfrm>
+      </p:grpSpPr>
+      <p:sp>
+        <p:nvSpPr>
+          <p:cNvPr id="2" name="Title 1"/>
+          <p:cNvSpPr>
+            <a:spLocks noGrp="1"/>
+          </p:cNvSpPr>
+          <p:nvPr>
+            <p:ph type="title"/>
+          </p:nvPr>
+        </p:nvSpPr>
+        <p:spPr/>
+        <p:txBody>
+          <a:bodyPr/>
+          <a:lstStyle/>
+          <a:p>
+            <a:r>
+              <a:rPr lang="en-US" dirty="0" smtClean="0"/>
+              <a:t>Timeline</a:t>
+            </a:r>
+            <a:endParaRPr lang="en-US" dirty="0"/>
+          </a:p>
+        </p:txBody>
+      </p:sp>
+      <p:sp>
+        <p:nvSpPr>
+          <p:cNvPr id="3" name="Content Placeholder 2"/>
+          <p:cNvSpPr>
+            <a:spLocks noGrp="1"/>
+          </p:cNvSpPr>
+          <p:nvPr>
+            <p:ph idx="1"/>
+          </p:nvPr>
+        </p:nvSpPr>
+        <p:spPr/>
+        <p:txBody>
+          <a:bodyPr/>
+          <a:lstStyle/>
+          <a:p>
+            <a:endParaRPr lang="en-US"/>
+          </a:p>
+        </p:txBody>
+      </p:sp>
+    </p:spTree>
+    <p:extLst>
+      <p:ext uri="{BB962C8B-B14F-4D97-AF65-F5344CB8AC3E}">
+        <p14:creationId xmlns:p14="http://schemas.microsoft.com/office/powerpoint/2010/main" val="181572385"/>
+      </p:ext>
+    </p:extLst>
+  </p:cSld>
+  <p:clrMapOvr>
+    <a:masterClrMapping/>
+  </p:clrMapOvr>
+  <p:timing>
+    <p:tnLst>
+      <p:par>
+        <p:cTn id="1" dur="indefinite" restart="never" nodeType="tmRoot"/>
+      </p:par>
+    </p:tnLst>
+  </p:timing>
+</p:sld>
+</file>
+
+<file path=ppt/slides/slide11.xml><?xml version="1.0" encoding="utf-8"?>
+<p:sld xmlns:a="http://schemas.openxmlformats.org/drawingml/2006/main" xmlns:r="http://schemas.openxmlformats.org/officeDocument/2006/relationships" xmlns:p="http://schemas.openxmlformats.org/presentationml/2006/main">
+  <p:cSld>
+    <p:spTree>
+      <p:nvGrpSpPr>
+        <p:cNvPr id="1" name=""/>
+        <p:cNvGrpSpPr/>
+        <p:nvPr/>
+      </p:nvGrpSpPr>
+      <p:grpSpPr>
+        <a:xfrm>
+          <a:off x="0" y="0"/>
+          <a:ext cx="0" cy="0"/>
+          <a:chOff x="0" y="0"/>
+          <a:chExt cx="0" cy="0"/>
+        </a:xfrm>
+      </p:grpSpPr>
+      <p:sp>
+        <p:nvSpPr>
+          <p:cNvPr id="2" name="Title 1"/>
+          <p:cNvSpPr>
+            <a:spLocks noGrp="1"/>
+          </p:cNvSpPr>
+          <p:nvPr>
+            <p:ph type="title"/>
+          </p:nvPr>
+        </p:nvSpPr>
+        <p:spPr/>
+        <p:txBody>
+          <a:bodyPr/>
+          <a:lstStyle/>
+          <a:p>
+            <a:r>
+              <a:rPr lang="en-US" dirty="0" smtClean="0">
+                <a:solidFill>
+                  <a:srgbClr val="26374B"/>
+                </a:solidFill>
+              </a:rPr>
+              <a:t>Sites</a:t>
+            </a:r>
+            <a:endParaRPr lang="en-US" dirty="0">
+              <a:solidFill>
+                <a:srgbClr val="26374B"/>
+              </a:solidFill>
+            </a:endParaRPr>
+          </a:p>
+        </p:txBody>
+      </p:sp>
+      <p:sp>
+        <p:nvSpPr>
+          <p:cNvPr id="3" name="Content Placeholder 2"/>
+          <p:cNvSpPr>
+            <a:spLocks noGrp="1"/>
+          </p:cNvSpPr>
+          <p:nvPr>
+            <p:ph idx="1"/>
+          </p:nvPr>
+        </p:nvSpPr>
+        <p:spPr>
+          <a:xfrm>
+            <a:off x="228600" y="1384300"/>
+            <a:ext cx="8686800" cy="2857500"/>
+          </a:xfrm>
+        </p:spPr>
+        <p:txBody>
+          <a:bodyPr>
+            <a:normAutofit fontScale="92500"/>
+          </a:bodyPr>
+          <a:lstStyle/>
+          <a:p>
+            <a:pPr marL="0" indent="0" algn="ctr">
+              <a:buNone/>
+            </a:pPr>
+            <a:r>
+              <a:rPr lang="en-US" b="1" dirty="0">
+                <a:solidFill>
+                  <a:srgbClr val="26374B"/>
+                </a:solidFill>
+              </a:rPr>
+              <a:t>Live </a:t>
+            </a:r>
+            <a:r>
+              <a:rPr lang="en-US" b="1" dirty="0" smtClean="0">
+                <a:solidFill>
+                  <a:srgbClr val="26374B"/>
+                </a:solidFill>
+              </a:rPr>
+              <a:t>Sites</a:t>
+            </a:r>
+          </a:p>
+          <a:p>
+            <a:pPr marL="0" indent="0" algn="ctr">
+              <a:buNone/>
+            </a:pPr>
+            <a:r>
+              <a:rPr lang="en-US" b="1" dirty="0" smtClean="0">
+                <a:solidFill>
+                  <a:srgbClr val="236FC7"/>
+                </a:solidFill>
+              </a:rPr>
+              <a:t>http</a:t>
+            </a:r>
+            <a:r>
+              <a:rPr lang="en-US" b="1" dirty="0">
+                <a:solidFill>
+                  <a:srgbClr val="236FC7"/>
+                </a:solidFill>
+              </a:rPr>
+              <a:t>://</a:t>
+            </a:r>
+            <a:r>
+              <a:rPr lang="en-US" b="1" dirty="0" smtClean="0">
+                <a:solidFill>
+                  <a:srgbClr val="236FC7"/>
+                </a:solidFill>
+              </a:rPr>
+              <a:t>dsg.neu.edu/projects </a:t>
+            </a:r>
+            <a:endParaRPr lang="en-US" b="1" i="1" dirty="0" smtClean="0">
+              <a:solidFill>
+                <a:srgbClr val="236FC7"/>
+              </a:solidFill>
+            </a:endParaRPr>
+          </a:p>
+          <a:p>
+            <a:r>
+              <a:rPr lang="en-US" sz="2800" dirty="0" smtClean="0">
+                <a:solidFill>
+                  <a:srgbClr val="26374B"/>
+                </a:solidFill>
+              </a:rPr>
+              <a:t>Interviews </a:t>
+            </a:r>
+            <a:r>
+              <a:rPr lang="en-US" sz="2800" dirty="0">
+                <a:solidFill>
+                  <a:srgbClr val="26374B"/>
+                </a:solidFill>
+              </a:rPr>
+              <a:t>with Jewish Latin American Writers and </a:t>
+            </a:r>
+            <a:r>
+              <a:rPr lang="en-US" sz="2800" dirty="0" smtClean="0">
+                <a:solidFill>
+                  <a:srgbClr val="26374B"/>
+                </a:solidFill>
+              </a:rPr>
+              <a:t>Artists</a:t>
+            </a:r>
+          </a:p>
+          <a:p>
+            <a:r>
+              <a:rPr lang="en-US" sz="2800" dirty="0" smtClean="0">
+                <a:solidFill>
+                  <a:srgbClr val="26374B"/>
+                </a:solidFill>
+              </a:rPr>
+              <a:t>Picturing the World Gallery</a:t>
+            </a:r>
+          </a:p>
+          <a:p>
+            <a:r>
+              <a:rPr lang="en-US" sz="2800" dirty="0" smtClean="0">
+                <a:solidFill>
+                  <a:srgbClr val="26374B"/>
+                </a:solidFill>
+              </a:rPr>
+              <a:t>A </a:t>
+            </a:r>
+            <a:r>
+              <a:rPr lang="en-US" sz="2800" dirty="0">
+                <a:solidFill>
+                  <a:srgbClr val="26374B"/>
+                </a:solidFill>
+              </a:rPr>
+              <a:t>Proud Past: A History of Boston-</a:t>
+            </a:r>
+            <a:r>
+              <a:rPr lang="en-US" sz="2800" dirty="0" err="1">
+                <a:solidFill>
+                  <a:srgbClr val="26374B"/>
+                </a:solidFill>
+              </a:rPr>
+              <a:t>Bouvé</a:t>
+            </a:r>
+            <a:r>
+              <a:rPr lang="en-US" sz="2800" dirty="0">
+                <a:solidFill>
+                  <a:srgbClr val="26374B"/>
+                </a:solidFill>
+              </a:rPr>
+              <a:t> College, </a:t>
+            </a:r>
+            <a:r>
+              <a:rPr lang="en-US" sz="2800" dirty="0" smtClean="0">
+                <a:solidFill>
+                  <a:srgbClr val="26374B"/>
+                </a:solidFill>
+              </a:rPr>
+              <a:t>1913-1981</a:t>
+            </a:r>
+          </a:p>
+        </p:txBody>
+      </p:sp>
+      <p:sp>
+        <p:nvSpPr>
+          <p:cNvPr id="5" name="Content Placeholder 2"/>
+          <p:cNvSpPr txBox="1">
+            <a:spLocks/>
+          </p:cNvSpPr>
+          <p:nvPr/>
+        </p:nvSpPr>
+        <p:spPr>
+          <a:xfrm>
+            <a:off x="182881" y="4380989"/>
+            <a:ext cx="4859383" cy="2240279"/>
+          </a:xfrm>
+          <a:prstGeom prst="rect">
+            <a:avLst/>
+          </a:prstGeom>
+        </p:spPr>
+        <p:txBody>
+          <a:bodyPr vert="horz" lIns="91440" tIns="45720" rIns="91440" bIns="45720" rtlCol="0">
+            <a:noAutofit/>
+          </a:bodyPr>
+          <a:lstStyle>
+            <a:lvl1pPr marL="342900" indent="-342900" algn="l" defTabSz="457200" rtl="0" eaLnBrk="1" latinLnBrk="0" hangingPunct="1">
+              <a:spcBef>
+                <a:spcPct val="20000"/>
+              </a:spcBef>
+              <a:buFont typeface="Arial"/>
+              <a:buChar char="•"/>
+              <a:defRPr sz="3200" kern="1200">
+                <a:solidFill>
+                  <a:schemeClr val="tx1"/>
+                </a:solidFill>
+                <a:latin typeface="+mn-lt"/>
+                <a:ea typeface="+mn-ea"/>
+                <a:cs typeface="+mn-cs"/>
+              </a:defRPr>
+            </a:lvl1pPr>
+            <a:lvl2pPr marL="742950" indent="-285750" algn="l" defTabSz="457200" rtl="0" eaLnBrk="1" latinLnBrk="0" hangingPunct="1">
+              <a:spcBef>
+                <a:spcPct val="20000"/>
+              </a:spcBef>
+              <a:buFont typeface="Arial"/>
+              <a:buChar char="–"/>
+              <a:defRPr sz="2800" kern="1200">
+                <a:solidFill>
+                  <a:schemeClr val="tx1"/>
+                </a:solidFill>
+                <a:latin typeface="+mn-lt"/>
+                <a:ea typeface="+mn-ea"/>
+                <a:cs typeface="+mn-cs"/>
+              </a:defRPr>
+            </a:lvl2pPr>
+            <a:lvl3pPr marL="1143000" indent="-228600" algn="l" defTabSz="457200" rtl="0" eaLnBrk="1" latinLnBrk="0" hangingPunct="1">
+              <a:spcBef>
+                <a:spcPct val="20000"/>
+              </a:spcBef>
+              <a:buFont typeface="Arial"/>
+              <a:buChar char="•"/>
+              <a:defRPr sz="2400" kern="1200">
+                <a:solidFill>
+                  <a:schemeClr val="tx1"/>
+                </a:solidFill>
+                <a:latin typeface="+mn-lt"/>
+                <a:ea typeface="+mn-ea"/>
+                <a:cs typeface="+mn-cs"/>
+              </a:defRPr>
+            </a:lvl3pPr>
+            <a:lvl4pPr marL="1600200" indent="-228600" algn="l" defTabSz="457200" rtl="0" eaLnBrk="1" latinLnBrk="0" hangingPunct="1">
+              <a:spcBef>
+                <a:spcPct val="20000"/>
+              </a:spcBef>
+              <a:buFont typeface="Arial"/>
+              <a:buChar char="–"/>
+              <a:defRPr sz="2000" kern="1200">
+                <a:solidFill>
+                  <a:schemeClr val="tx1"/>
+                </a:solidFill>
+                <a:latin typeface="+mn-lt"/>
+                <a:ea typeface="+mn-ea"/>
+                <a:cs typeface="+mn-cs"/>
+              </a:defRPr>
+            </a:lvl4pPr>
+            <a:lvl5pPr marL="2057400" indent="-228600" algn="l" defTabSz="457200" rtl="0" eaLnBrk="1" latinLnBrk="0" hangingPunct="1">
+              <a:spcBef>
+                <a:spcPct val="20000"/>
+              </a:spcBef>
+              <a:buFont typeface="Arial"/>
+              <a:buChar char="»"/>
+              <a:defRPr sz="2000" kern="1200">
+                <a:solidFill>
+                  <a:schemeClr val="tx1"/>
+                </a:solidFill>
+                <a:latin typeface="+mn-lt"/>
+                <a:ea typeface="+mn-ea"/>
+                <a:cs typeface="+mn-cs"/>
+              </a:defRPr>
+            </a:lvl5pPr>
+            <a:lvl6pPr marL="2514600" indent="-228600" algn="l" defTabSz="457200" rtl="0" eaLnBrk="1" latinLnBrk="0" hangingPunct="1">
+              <a:spcBef>
+                <a:spcPct val="20000"/>
+              </a:spcBef>
+              <a:buFont typeface="Arial"/>
+              <a:buChar char="•"/>
+              <a:defRPr sz="2000" kern="1200">
+                <a:solidFill>
+                  <a:schemeClr val="tx1"/>
+                </a:solidFill>
+                <a:latin typeface="+mn-lt"/>
+                <a:ea typeface="+mn-ea"/>
+                <a:cs typeface="+mn-cs"/>
+              </a:defRPr>
+            </a:lvl6pPr>
+            <a:lvl7pPr marL="2971800" indent="-228600" algn="l" defTabSz="457200" rtl="0" eaLnBrk="1" latinLnBrk="0" hangingPunct="1">
+              <a:spcBef>
+                <a:spcPct val="20000"/>
+              </a:spcBef>
+              <a:buFont typeface="Arial"/>
+              <a:buChar char="•"/>
+              <a:defRPr sz="2000" kern="1200">
+                <a:solidFill>
+                  <a:schemeClr val="tx1"/>
+                </a:solidFill>
+                <a:latin typeface="+mn-lt"/>
+                <a:ea typeface="+mn-ea"/>
+                <a:cs typeface="+mn-cs"/>
+              </a:defRPr>
+            </a:lvl7pPr>
+            <a:lvl8pPr marL="3429000" indent="-228600" algn="l" defTabSz="457200" rtl="0" eaLnBrk="1" latinLnBrk="0" hangingPunct="1">
+              <a:spcBef>
+                <a:spcPct val="20000"/>
+              </a:spcBef>
+              <a:buFont typeface="Arial"/>
+              <a:buChar char="•"/>
+              <a:defRPr sz="2000" kern="1200">
+                <a:solidFill>
+                  <a:schemeClr val="tx1"/>
+                </a:solidFill>
+                <a:latin typeface="+mn-lt"/>
+                <a:ea typeface="+mn-ea"/>
+                <a:cs typeface="+mn-cs"/>
+              </a:defRPr>
+            </a:lvl8pPr>
+            <a:lvl9pPr marL="3886200" indent="-228600" algn="l" defTabSz="457200" rtl="0" eaLnBrk="1" latinLnBrk="0" hangingPunct="1">
+              <a:spcBef>
+                <a:spcPct val="20000"/>
+              </a:spcBef>
+              <a:buFont typeface="Arial"/>
+              <a:buChar char="•"/>
+              <a:defRPr sz="2000" kern="1200">
+                <a:solidFill>
+                  <a:schemeClr val="tx1"/>
+                </a:solidFill>
+                <a:latin typeface="+mn-lt"/>
+                <a:ea typeface="+mn-ea"/>
+                <a:cs typeface="+mn-cs"/>
+              </a:defRPr>
+            </a:lvl9pPr>
+          </a:lstStyle>
+          <a:p>
+            <a:pPr marL="0" indent="0" algn="ctr">
+              <a:buFont typeface="Arial"/>
+              <a:buNone/>
+            </a:pPr>
+            <a:r>
+              <a:rPr lang="en-US" sz="1700" b="1" dirty="0" smtClean="0">
+                <a:solidFill>
+                  <a:srgbClr val="26374B"/>
+                </a:solidFill>
+              </a:rPr>
+              <a:t>In Development</a:t>
+            </a:r>
+          </a:p>
+          <a:p>
+            <a:r>
+              <a:rPr lang="en-US" sz="1700" dirty="0" smtClean="0">
+                <a:solidFill>
+                  <a:srgbClr val="26374B"/>
+                </a:solidFill>
+              </a:rPr>
+              <a:t>The Catskills Institute</a:t>
+            </a:r>
+          </a:p>
+          <a:p>
+            <a:r>
+              <a:rPr lang="en-US" sz="1700" dirty="0" smtClean="0">
+                <a:solidFill>
+                  <a:srgbClr val="26374B"/>
+                </a:solidFill>
+              </a:rPr>
+              <a:t>Holocaust Awareness Week Programming</a:t>
+            </a:r>
+          </a:p>
+          <a:p>
+            <a:r>
+              <a:rPr lang="en-US" sz="1700" dirty="0" smtClean="0">
+                <a:solidFill>
+                  <a:srgbClr val="26374B"/>
+                </a:solidFill>
+              </a:rPr>
+              <a:t>Spectrum Literary Magazine</a:t>
+            </a:r>
+          </a:p>
+          <a:p>
+            <a:r>
+              <a:rPr lang="en-US" sz="1700" dirty="0" smtClean="0">
+                <a:solidFill>
+                  <a:srgbClr val="26374B"/>
+                </a:solidFill>
+              </a:rPr>
+              <a:t>DMC Studios Student Work Showcase</a:t>
+            </a:r>
+          </a:p>
+          <a:p>
+            <a:r>
+              <a:rPr lang="en-US" sz="1700" dirty="0" smtClean="0">
+                <a:solidFill>
+                  <a:srgbClr val="26374B"/>
+                </a:solidFill>
+              </a:rPr>
+              <a:t>United South End Settlements</a:t>
+            </a:r>
+          </a:p>
+        </p:txBody>
+      </p:sp>
+      <p:sp>
+        <p:nvSpPr>
+          <p:cNvPr id="6" name="Content Placeholder 2"/>
+          <p:cNvSpPr txBox="1">
+            <a:spLocks/>
+          </p:cNvSpPr>
+          <p:nvPr/>
+        </p:nvSpPr>
+        <p:spPr>
+          <a:xfrm>
+            <a:off x="4572000" y="4367926"/>
+            <a:ext cx="4598128" cy="2148839"/>
+          </a:xfrm>
+          <a:prstGeom prst="rect">
+            <a:avLst/>
+          </a:prstGeom>
+        </p:spPr>
+        <p:txBody>
+          <a:bodyPr vert="horz" lIns="91440" tIns="45720" rIns="91440" bIns="45720" rtlCol="0">
+            <a:noAutofit/>
+          </a:bodyPr>
+          <a:lstStyle>
+            <a:lvl1pPr marL="342900" indent="-342900" algn="l" defTabSz="457200" rtl="0" eaLnBrk="1" latinLnBrk="0" hangingPunct="1">
+              <a:spcBef>
+                <a:spcPct val="20000"/>
+              </a:spcBef>
+              <a:buFont typeface="Arial"/>
+              <a:buChar char="•"/>
+              <a:defRPr sz="3200" kern="1200">
+                <a:solidFill>
+                  <a:schemeClr val="tx1"/>
+                </a:solidFill>
+                <a:latin typeface="+mn-lt"/>
+                <a:ea typeface="+mn-ea"/>
+                <a:cs typeface="+mn-cs"/>
+              </a:defRPr>
+            </a:lvl1pPr>
+            <a:lvl2pPr marL="742950" indent="-285750" algn="l" defTabSz="457200" rtl="0" eaLnBrk="1" latinLnBrk="0" hangingPunct="1">
+              <a:spcBef>
+                <a:spcPct val="20000"/>
+              </a:spcBef>
+              <a:buFont typeface="Arial"/>
+              <a:buChar char="–"/>
+              <a:defRPr sz="2800" kern="1200">
+                <a:solidFill>
+                  <a:schemeClr val="tx1"/>
+                </a:solidFill>
+                <a:latin typeface="+mn-lt"/>
+                <a:ea typeface="+mn-ea"/>
+                <a:cs typeface="+mn-cs"/>
+              </a:defRPr>
+            </a:lvl2pPr>
+            <a:lvl3pPr marL="1143000" indent="-228600" algn="l" defTabSz="457200" rtl="0" eaLnBrk="1" latinLnBrk="0" hangingPunct="1">
+              <a:spcBef>
+                <a:spcPct val="20000"/>
+              </a:spcBef>
+              <a:buFont typeface="Arial"/>
+              <a:buChar char="•"/>
+              <a:defRPr sz="2400" kern="1200">
+                <a:solidFill>
+                  <a:schemeClr val="tx1"/>
+                </a:solidFill>
+                <a:latin typeface="+mn-lt"/>
+                <a:ea typeface="+mn-ea"/>
+                <a:cs typeface="+mn-cs"/>
+              </a:defRPr>
+            </a:lvl3pPr>
+            <a:lvl4pPr marL="1600200" indent="-228600" algn="l" defTabSz="457200" rtl="0" eaLnBrk="1" latinLnBrk="0" hangingPunct="1">
+              <a:spcBef>
+                <a:spcPct val="20000"/>
+              </a:spcBef>
+              <a:buFont typeface="Arial"/>
+              <a:buChar char="–"/>
+              <a:defRPr sz="2000" kern="1200">
+                <a:solidFill>
+                  <a:schemeClr val="tx1"/>
+                </a:solidFill>
+                <a:latin typeface="+mn-lt"/>
+                <a:ea typeface="+mn-ea"/>
+                <a:cs typeface="+mn-cs"/>
+              </a:defRPr>
+            </a:lvl4pPr>
+            <a:lvl5pPr marL="2057400" indent="-228600" algn="l" defTabSz="457200" rtl="0" eaLnBrk="1" latinLnBrk="0" hangingPunct="1">
+              <a:spcBef>
+                <a:spcPct val="20000"/>
+              </a:spcBef>
+              <a:buFont typeface="Arial"/>
+              <a:buChar char="»"/>
+              <a:defRPr sz="2000" kern="1200">
+                <a:solidFill>
+                  <a:schemeClr val="tx1"/>
+                </a:solidFill>
+                <a:latin typeface="+mn-lt"/>
+                <a:ea typeface="+mn-ea"/>
+                <a:cs typeface="+mn-cs"/>
+              </a:defRPr>
+            </a:lvl5pPr>
+            <a:lvl6pPr marL="2514600" indent="-228600" algn="l" defTabSz="457200" rtl="0" eaLnBrk="1" latinLnBrk="0" hangingPunct="1">
+              <a:spcBef>
+                <a:spcPct val="20000"/>
+              </a:spcBef>
+              <a:buFont typeface="Arial"/>
+              <a:buChar char="•"/>
+              <a:defRPr sz="2000" kern="1200">
+                <a:solidFill>
+                  <a:schemeClr val="tx1"/>
+                </a:solidFill>
+                <a:latin typeface="+mn-lt"/>
+                <a:ea typeface="+mn-ea"/>
+                <a:cs typeface="+mn-cs"/>
+              </a:defRPr>
+            </a:lvl6pPr>
+            <a:lvl7pPr marL="2971800" indent="-228600" algn="l" defTabSz="457200" rtl="0" eaLnBrk="1" latinLnBrk="0" hangingPunct="1">
+              <a:spcBef>
+                <a:spcPct val="20000"/>
+              </a:spcBef>
+              <a:buFont typeface="Arial"/>
+              <a:buChar char="•"/>
+              <a:defRPr sz="2000" kern="1200">
+                <a:solidFill>
+                  <a:schemeClr val="tx1"/>
+                </a:solidFill>
+                <a:latin typeface="+mn-lt"/>
+                <a:ea typeface="+mn-ea"/>
+                <a:cs typeface="+mn-cs"/>
+              </a:defRPr>
+            </a:lvl7pPr>
+            <a:lvl8pPr marL="3429000" indent="-228600" algn="l" defTabSz="457200" rtl="0" eaLnBrk="1" latinLnBrk="0" hangingPunct="1">
+              <a:spcBef>
+                <a:spcPct val="20000"/>
+              </a:spcBef>
+              <a:buFont typeface="Arial"/>
+              <a:buChar char="•"/>
+              <a:defRPr sz="2000" kern="1200">
+                <a:solidFill>
+                  <a:schemeClr val="tx1"/>
+                </a:solidFill>
+                <a:latin typeface="+mn-lt"/>
+                <a:ea typeface="+mn-ea"/>
+                <a:cs typeface="+mn-cs"/>
+              </a:defRPr>
+            </a:lvl8pPr>
+            <a:lvl9pPr marL="3886200" indent="-228600" algn="l" defTabSz="457200" rtl="0" eaLnBrk="1" latinLnBrk="0" hangingPunct="1">
+              <a:spcBef>
+                <a:spcPct val="20000"/>
+              </a:spcBef>
+              <a:buFont typeface="Arial"/>
+              <a:buChar char="•"/>
+              <a:defRPr sz="2000" kern="1200">
+                <a:solidFill>
+                  <a:schemeClr val="tx1"/>
+                </a:solidFill>
+                <a:latin typeface="+mn-lt"/>
+                <a:ea typeface="+mn-ea"/>
+                <a:cs typeface="+mn-cs"/>
+              </a:defRPr>
+            </a:lvl9pPr>
+          </a:lstStyle>
+          <a:p>
+            <a:pPr marL="0" indent="0" algn="ctr">
+              <a:buFont typeface="Arial"/>
+              <a:buNone/>
+            </a:pPr>
+            <a:r>
+              <a:rPr lang="en-US" sz="1700" b="1" dirty="0" smtClean="0">
+                <a:solidFill>
+                  <a:srgbClr val="26374B"/>
+                </a:solidFill>
+              </a:rPr>
+              <a:t>New Projects Projected for 2016</a:t>
+            </a:r>
+          </a:p>
+          <a:p>
+            <a:r>
+              <a:rPr lang="en-US" sz="1700" dirty="0" smtClean="0">
+                <a:solidFill>
+                  <a:srgbClr val="26374B"/>
+                </a:solidFill>
+              </a:rPr>
+              <a:t>Dominican Prayer Book</a:t>
+            </a:r>
+          </a:p>
+          <a:p>
+            <a:r>
+              <a:rPr lang="en-US" sz="1700" dirty="0" smtClean="0">
+                <a:solidFill>
+                  <a:srgbClr val="26374B"/>
+                </a:solidFill>
+              </a:rPr>
+              <a:t>The Civil Rights and Restorative Justice Project</a:t>
+            </a:r>
+          </a:p>
+          <a:p>
+            <a:r>
+              <a:rPr lang="en-US" sz="1700" dirty="0" smtClean="0">
+                <a:solidFill>
+                  <a:srgbClr val="26374B"/>
+                </a:solidFill>
+              </a:rPr>
+              <a:t>The Early Black Boston Digital Almanac </a:t>
+            </a:r>
+          </a:p>
+          <a:p>
+            <a:r>
+              <a:rPr lang="en-US" sz="1700" dirty="0" smtClean="0">
+                <a:solidFill>
+                  <a:srgbClr val="26374B"/>
+                </a:solidFill>
+              </a:rPr>
+              <a:t>The Early Caribbean Digital Archive</a:t>
+            </a:r>
+          </a:p>
+          <a:p>
+            <a:r>
+              <a:rPr lang="en-US" sz="1700" dirty="0" smtClean="0">
+                <a:solidFill>
+                  <a:srgbClr val="26374B"/>
+                </a:solidFill>
+              </a:rPr>
+              <a:t>African American Institute Archives</a:t>
+            </a:r>
+          </a:p>
+          <a:p>
+            <a:r>
+              <a:rPr lang="en-US" sz="1700" dirty="0" smtClean="0">
+                <a:solidFill>
+                  <a:srgbClr val="26374B"/>
+                </a:solidFill>
+              </a:rPr>
+              <a:t>Thoreau’s Journal Drawings</a:t>
+            </a:r>
+            <a:endParaRPr lang="en-US" sz="1700" dirty="0">
+              <a:solidFill>
+                <a:srgbClr val="26374B"/>
+              </a:solidFill>
+            </a:endParaRPr>
+          </a:p>
+        </p:txBody>
+      </p:sp>
+    </p:spTree>
+    <p:extLst>
+      <p:ext uri="{BB962C8B-B14F-4D97-AF65-F5344CB8AC3E}">
+        <p14:creationId xmlns:p14="http://schemas.microsoft.com/office/powerpoint/2010/main" val="185033428"/>
+      </p:ext>
+    </p:extLst>
+  </p:cSld>
+  <p:clrMapOvr>
+    <a:masterClrMapping/>
+  </p:clrMapOvr>
+  <p:timing>
+    <p:tnLst>
+      <p:par>
+        <p:cTn id="1" dur="indefinite" restart="never" nodeType="tmRoot"/>
+      </p:par>
+    </p:tnLst>
+  </p:timing>
+</p:sld>
+</file>
+
+<file path=ppt/slides/slide12.xml><?xml version="1.0" encoding="utf-8"?>
+<p:sld xmlns:a="http://schemas.openxmlformats.org/drawingml/2006/main" xmlns:r="http://schemas.openxmlformats.org/officeDocument/2006/relationships" xmlns:p="http://schemas.openxmlformats.org/presentationml/2006/main">
+  <p:cSld>
+    <p:spTree>
+      <p:nvGrpSpPr>
+        <p:cNvPr id="1" name=""/>
+        <p:cNvGrpSpPr/>
+        <p:nvPr/>
+      </p:nvGrpSpPr>
+      <p:grpSpPr>
+        <a:xfrm>
+          <a:off x="0" y="0"/>
+          <a:ext cx="0" cy="0"/>
+          <a:chOff x="0" y="0"/>
+          <a:chExt cx="0" cy="0"/>
+        </a:xfrm>
+      </p:grpSpPr>
+      <p:pic>
+        <p:nvPicPr>
+          <p:cNvPr id="10" name="Picture 9" descr="DRS.png"/>
+          <p:cNvPicPr>
+            <a:picLocks noChangeAspect="1"/>
+          </p:cNvPicPr>
+          <p:nvPr/>
+        </p:nvPicPr>
+        <p:blipFill>
+          <a:blip r:embed="rId3">
+            <a:extLst>
+              <a:ext uri="{28A0092B-C50C-407E-A947-70E740481C1C}">
+                <a14:useLocalDpi xmlns:a14="http://schemas.microsoft.com/office/drawing/2010/main" val="0"/>
+              </a:ext>
+            </a:extLst>
+          </a:blip>
+          <a:stretch>
+            <a:fillRect/>
+          </a:stretch>
+        </p:blipFill>
+        <p:spPr>
+          <a:xfrm>
+            <a:off x="7471" y="5764295"/>
+            <a:ext cx="5401087" cy="662129"/>
+          </a:xfrm>
+          <a:prstGeom prst="rect">
+            <a:avLst/>
+          </a:prstGeom>
+          <a:ln>
+            <a:noFill/>
+          </a:ln>
+        </p:spPr>
+      </p:pic>
+      <p:sp>
+        <p:nvSpPr>
+          <p:cNvPr id="11" name="TextBox 10"/>
+          <p:cNvSpPr txBox="1"/>
+          <p:nvPr/>
+        </p:nvSpPr>
+        <p:spPr>
+          <a:xfrm>
+            <a:off x="-209643" y="6222144"/>
+            <a:ext cx="5139765" cy="665740"/>
+          </a:xfrm>
+          <a:prstGeom prst="rect">
+            <a:avLst/>
+          </a:prstGeom>
+          <a:noFill/>
+          <a:ln>
+            <a:noFill/>
+          </a:ln>
+        </p:spPr>
+        <p:txBody>
+          <a:bodyPr wrap="square" lIns="329104" tIns="164551" rIns="329104" bIns="164551" numCol="1" rtlCol="0" anchor="ctr">
+            <a:spAutoFit/>
+          </a:bodyPr>
+          <a:lstStyle/>
+          <a:p>
+            <a:pPr>
+              <a:lnSpc>
+                <a:spcPct val="110000"/>
+              </a:lnSpc>
+            </a:pPr>
+            <a:r>
+              <a:rPr lang="en-US" sz="2000" dirty="0" err="1" smtClean="0">
+                <a:solidFill>
+                  <a:srgbClr val="236FC7"/>
+                </a:solidFill>
+                <a:latin typeface="Gotham Book"/>
+                <a:cs typeface="Gotham Book"/>
+              </a:rPr>
+              <a:t>repository.library.northeastern.edu</a:t>
+            </a:r>
+            <a:endParaRPr lang="en-US" sz="2000" dirty="0" smtClean="0">
+              <a:solidFill>
+                <a:srgbClr val="236FC7"/>
+              </a:solidFill>
+              <a:latin typeface="Gotham Book"/>
+              <a:cs typeface="Gotham Book"/>
+            </a:endParaRPr>
+          </a:p>
+        </p:txBody>
+      </p:sp>
+      <p:sp>
+        <p:nvSpPr>
+          <p:cNvPr id="4" name="TextBox 3"/>
+          <p:cNvSpPr txBox="1"/>
+          <p:nvPr/>
+        </p:nvSpPr>
+        <p:spPr>
+          <a:xfrm>
+            <a:off x="9641093" y="3743386"/>
+            <a:ext cx="184666" cy="369332"/>
+          </a:xfrm>
+          <a:prstGeom prst="rect">
+            <a:avLst/>
+          </a:prstGeom>
+          <a:noFill/>
+        </p:spPr>
+        <p:txBody>
+          <a:bodyPr wrap="none" rtlCol="0">
+            <a:spAutoFit/>
+          </a:bodyPr>
+          <a:lstStyle/>
+          <a:p>
+            <a:endParaRPr lang="en-US" dirty="0"/>
+          </a:p>
+        </p:txBody>
+      </p:sp>
+      <p:sp>
+        <p:nvSpPr>
+          <p:cNvPr id="9" name="TextBox 8"/>
+          <p:cNvSpPr txBox="1"/>
+          <p:nvPr/>
+        </p:nvSpPr>
+        <p:spPr>
+          <a:xfrm>
+            <a:off x="5602942" y="5848195"/>
+            <a:ext cx="3772646" cy="1039689"/>
+          </a:xfrm>
+          <a:prstGeom prst="rect">
+            <a:avLst/>
+          </a:prstGeom>
+          <a:noFill/>
+          <a:ln>
+            <a:noFill/>
+          </a:ln>
+        </p:spPr>
+        <p:txBody>
+          <a:bodyPr wrap="square" lIns="329104" tIns="164551" rIns="329104" bIns="164551" numCol="1" rtlCol="0" anchor="ctr">
+            <a:spAutoFit/>
+          </a:bodyPr>
+          <a:lstStyle/>
+          <a:p>
+            <a:pPr algn="r">
+              <a:lnSpc>
+                <a:spcPct val="110000"/>
+              </a:lnSpc>
+            </a:pPr>
+            <a:r>
+              <a:rPr lang="en-US" sz="1400" dirty="0" smtClean="0">
+                <a:solidFill>
+                  <a:srgbClr val="26374B"/>
+                </a:solidFill>
+                <a:latin typeface="Gotham Book"/>
+                <a:cs typeface="Gotham Book"/>
+              </a:rPr>
+              <a:t>Sarah Sweeney</a:t>
+            </a:r>
+          </a:p>
+          <a:p>
+            <a:pPr algn="r">
+              <a:lnSpc>
+                <a:spcPct val="110000"/>
+              </a:lnSpc>
+            </a:pPr>
+            <a:r>
+              <a:rPr lang="en-US" sz="1400" dirty="0" smtClean="0">
+                <a:solidFill>
+                  <a:srgbClr val="26374B"/>
+                </a:solidFill>
+                <a:latin typeface="Gotham Book"/>
+                <a:cs typeface="Gotham Book"/>
+              </a:rPr>
+              <a:t>Digital Repository Manager</a:t>
+            </a:r>
+          </a:p>
+          <a:p>
+            <a:pPr algn="r">
+              <a:lnSpc>
+                <a:spcPct val="110000"/>
+              </a:lnSpc>
+            </a:pPr>
+            <a:r>
+              <a:rPr lang="en-US" sz="1400" dirty="0" smtClean="0">
+                <a:solidFill>
+                  <a:srgbClr val="26374B"/>
+                </a:solidFill>
+                <a:latin typeface="Gotham Book"/>
+                <a:cs typeface="Gotham Book"/>
+              </a:rPr>
+              <a:t>Northeastern University Library</a:t>
+            </a:r>
+            <a:endParaRPr lang="en-US" sz="1400" dirty="0">
+              <a:solidFill>
+                <a:srgbClr val="26374B"/>
+              </a:solidFill>
+              <a:latin typeface="Gotham Book"/>
+              <a:cs typeface="Gotham Book"/>
+            </a:endParaRPr>
+          </a:p>
+        </p:txBody>
+      </p:sp>
+      <p:sp>
+        <p:nvSpPr>
+          <p:cNvPr id="7" name="Subtitle 2"/>
+          <p:cNvSpPr txBox="1">
+            <a:spLocks/>
+          </p:cNvSpPr>
+          <p:nvPr/>
+        </p:nvSpPr>
+        <p:spPr>
+          <a:xfrm>
+            <a:off x="218043" y="1829059"/>
+            <a:ext cx="2145492" cy="2178560"/>
+          </a:xfrm>
+          <a:prstGeom prst="rect">
+            <a:avLst/>
+          </a:prstGeom>
+        </p:spPr>
+        <p:txBody>
+          <a:bodyPr vert="horz" lIns="91440" tIns="45720" rIns="91440" bIns="45720" rtlCol="0">
+            <a:noAutofit/>
+          </a:bodyPr>
+          <a:lstStyle>
+            <a:lvl1pPr marL="0" indent="0" algn="ctr" defTabSz="457200" rtl="0" eaLnBrk="1" latinLnBrk="0" hangingPunct="1">
+              <a:spcBef>
+                <a:spcPct val="20000"/>
+              </a:spcBef>
+              <a:buFont typeface="Arial"/>
+              <a:buNone/>
+              <a:defRPr sz="3200" kern="1200">
+                <a:solidFill>
+                  <a:schemeClr val="tx1">
+                    <a:tint val="75000"/>
+                  </a:schemeClr>
+                </a:solidFill>
+                <a:latin typeface="+mn-lt"/>
+                <a:ea typeface="+mn-ea"/>
+                <a:cs typeface="+mn-cs"/>
+              </a:defRPr>
+            </a:lvl1pPr>
+            <a:lvl2pPr marL="457200" indent="0" algn="ctr" defTabSz="457200" rtl="0" eaLnBrk="1" latinLnBrk="0" hangingPunct="1">
+              <a:spcBef>
+                <a:spcPct val="20000"/>
+              </a:spcBef>
+              <a:buFont typeface="Arial"/>
+              <a:buNone/>
+              <a:defRPr sz="2800" kern="1200">
+                <a:solidFill>
+                  <a:schemeClr val="tx1">
+                    <a:tint val="75000"/>
+                  </a:schemeClr>
+                </a:solidFill>
+                <a:latin typeface="+mn-lt"/>
+                <a:ea typeface="+mn-ea"/>
+                <a:cs typeface="+mn-cs"/>
+              </a:defRPr>
+            </a:lvl2pPr>
+            <a:lvl3pPr marL="914400" indent="0" algn="ctr" defTabSz="457200" rtl="0" eaLnBrk="1" latinLnBrk="0" hangingPunct="1">
+              <a:spcBef>
+                <a:spcPct val="20000"/>
+              </a:spcBef>
+              <a:buFont typeface="Arial"/>
+              <a:buNone/>
+              <a:defRPr sz="2400" kern="1200">
+                <a:solidFill>
+                  <a:schemeClr val="tx1">
+                    <a:tint val="75000"/>
+                  </a:schemeClr>
+                </a:solidFill>
+                <a:latin typeface="+mn-lt"/>
+                <a:ea typeface="+mn-ea"/>
+                <a:cs typeface="+mn-cs"/>
+              </a:defRPr>
+            </a:lvl3pPr>
+            <a:lvl4pPr marL="1371600" indent="0" algn="ctr" defTabSz="457200" rtl="0" eaLnBrk="1" latinLnBrk="0" hangingPunct="1">
+              <a:spcBef>
+                <a:spcPct val="20000"/>
+              </a:spcBef>
+              <a:buFont typeface="Arial"/>
+              <a:buNone/>
+              <a:defRPr sz="2000" kern="1200">
+                <a:solidFill>
+                  <a:schemeClr val="tx1">
+                    <a:tint val="75000"/>
+                  </a:schemeClr>
+                </a:solidFill>
+                <a:latin typeface="+mn-lt"/>
+                <a:ea typeface="+mn-ea"/>
+                <a:cs typeface="+mn-cs"/>
+              </a:defRPr>
+            </a:lvl4pPr>
+            <a:lvl5pPr marL="1828800" indent="0" algn="ctr" defTabSz="457200" rtl="0" eaLnBrk="1" latinLnBrk="0" hangingPunct="1">
+              <a:spcBef>
+                <a:spcPct val="20000"/>
+              </a:spcBef>
+              <a:buFont typeface="Arial"/>
+              <a:buNone/>
+              <a:defRPr sz="2000" kern="1200">
+                <a:solidFill>
+                  <a:schemeClr val="tx1">
+                    <a:tint val="75000"/>
+                  </a:schemeClr>
+                </a:solidFill>
+                <a:latin typeface="+mn-lt"/>
+                <a:ea typeface="+mn-ea"/>
+                <a:cs typeface="+mn-cs"/>
+              </a:defRPr>
+            </a:lvl5pPr>
+            <a:lvl6pPr marL="2286000" indent="0" algn="ctr" defTabSz="457200" rtl="0" eaLnBrk="1" latinLnBrk="0" hangingPunct="1">
+              <a:spcBef>
+                <a:spcPct val="20000"/>
+              </a:spcBef>
+              <a:buFont typeface="Arial"/>
+              <a:buNone/>
+              <a:defRPr sz="2000" kern="1200">
+                <a:solidFill>
+                  <a:schemeClr val="tx1">
+                    <a:tint val="75000"/>
+                  </a:schemeClr>
+                </a:solidFill>
+                <a:latin typeface="+mn-lt"/>
+                <a:ea typeface="+mn-ea"/>
+                <a:cs typeface="+mn-cs"/>
+              </a:defRPr>
+            </a:lvl6pPr>
+            <a:lvl7pPr marL="2743200" indent="0" algn="ctr" defTabSz="457200" rtl="0" eaLnBrk="1" latinLnBrk="0" hangingPunct="1">
+              <a:spcBef>
+                <a:spcPct val="20000"/>
+              </a:spcBef>
+              <a:buFont typeface="Arial"/>
+              <a:buNone/>
+              <a:defRPr sz="2000" kern="1200">
+                <a:solidFill>
+                  <a:schemeClr val="tx1">
+                    <a:tint val="75000"/>
+                  </a:schemeClr>
+                </a:solidFill>
+                <a:latin typeface="+mn-lt"/>
+                <a:ea typeface="+mn-ea"/>
+                <a:cs typeface="+mn-cs"/>
+              </a:defRPr>
+            </a:lvl7pPr>
+            <a:lvl8pPr marL="3200400" indent="0" algn="ctr" defTabSz="457200" rtl="0" eaLnBrk="1" latinLnBrk="0" hangingPunct="1">
+              <a:spcBef>
+                <a:spcPct val="20000"/>
+              </a:spcBef>
+              <a:buFont typeface="Arial"/>
+              <a:buNone/>
+              <a:defRPr sz="2000" kern="1200">
+                <a:solidFill>
+                  <a:schemeClr val="tx1">
+                    <a:tint val="75000"/>
+                  </a:schemeClr>
+                </a:solidFill>
+                <a:latin typeface="+mn-lt"/>
+                <a:ea typeface="+mn-ea"/>
+                <a:cs typeface="+mn-cs"/>
+              </a:defRPr>
+            </a:lvl8pPr>
+            <a:lvl9pPr marL="3657600" indent="0" algn="ctr" defTabSz="457200" rtl="0" eaLnBrk="1" latinLnBrk="0" hangingPunct="1">
+              <a:spcBef>
+                <a:spcPct val="20000"/>
+              </a:spcBef>
+              <a:buFont typeface="Arial"/>
+              <a:buNone/>
+              <a:defRPr sz="2000" kern="1200">
+                <a:solidFill>
+                  <a:schemeClr val="tx1">
+                    <a:tint val="75000"/>
+                  </a:schemeClr>
+                </a:solidFill>
+                <a:latin typeface="+mn-lt"/>
+                <a:ea typeface="+mn-ea"/>
+                <a:cs typeface="+mn-cs"/>
+              </a:defRPr>
+            </a:lvl9pPr>
+          </a:lstStyle>
+          <a:p>
+            <a:pPr algn="r"/>
+            <a:r>
+              <a:rPr lang="en-US" sz="2700" b="1" i="1" dirty="0" smtClean="0">
+                <a:solidFill>
+                  <a:srgbClr val="202F3E"/>
+                </a:solidFill>
+              </a:rPr>
+              <a:t>DSG</a:t>
+            </a:r>
+          </a:p>
+          <a:p>
+            <a:pPr algn="r"/>
+            <a:endParaRPr lang="en-US" sz="1800" b="1" i="1" dirty="0" smtClean="0">
+              <a:solidFill>
+                <a:srgbClr val="202F3E"/>
+              </a:solidFill>
+            </a:endParaRPr>
+          </a:p>
+          <a:p>
+            <a:pPr algn="r"/>
+            <a:r>
+              <a:rPr lang="en-US" sz="2700" b="1" i="1" dirty="0" smtClean="0">
+                <a:solidFill>
+                  <a:srgbClr val="202F3E"/>
+                </a:solidFill>
+              </a:rPr>
+              <a:t>Resources</a:t>
+            </a:r>
+          </a:p>
+          <a:p>
+            <a:pPr algn="r"/>
+            <a:endParaRPr lang="en-US" sz="1800" b="1" i="1" dirty="0" smtClean="0">
+              <a:solidFill>
+                <a:srgbClr val="202F3E"/>
+              </a:solidFill>
+            </a:endParaRPr>
+          </a:p>
+          <a:p>
+            <a:pPr algn="r"/>
+            <a:r>
+              <a:rPr lang="en-US" sz="2700" b="1" i="1" dirty="0" smtClean="0">
+                <a:solidFill>
+                  <a:srgbClr val="202F3E"/>
+                </a:solidFill>
+              </a:rPr>
+              <a:t>Contact</a:t>
+            </a:r>
+            <a:endParaRPr lang="en-US" sz="2700" b="1" i="1" dirty="0">
+              <a:solidFill>
+                <a:srgbClr val="202F3E"/>
+              </a:solidFill>
+            </a:endParaRPr>
+          </a:p>
+        </p:txBody>
+      </p:sp>
+      <p:sp>
+        <p:nvSpPr>
+          <p:cNvPr id="8" name="Subtitle 2"/>
+          <p:cNvSpPr txBox="1">
+            <a:spLocks/>
+          </p:cNvSpPr>
+          <p:nvPr/>
+        </p:nvSpPr>
+        <p:spPr>
+          <a:xfrm>
+            <a:off x="2551815" y="1829059"/>
+            <a:ext cx="6294473" cy="2178560"/>
+          </a:xfrm>
+          <a:prstGeom prst="rect">
+            <a:avLst/>
+          </a:prstGeom>
+        </p:spPr>
+        <p:txBody>
+          <a:bodyPr>
+            <a:normAutofit/>
+          </a:bodyPr>
+          <a:lstStyle>
+            <a:lvl1pPr marL="342900" indent="-342900" algn="l" defTabSz="457200" rtl="0" eaLnBrk="1" latinLnBrk="0" hangingPunct="1">
+              <a:spcBef>
+                <a:spcPct val="20000"/>
+              </a:spcBef>
+              <a:buFont typeface="Arial"/>
+              <a:buChar char="•"/>
+              <a:defRPr sz="3200" kern="1200">
+                <a:solidFill>
+                  <a:schemeClr val="tx1"/>
+                </a:solidFill>
+                <a:latin typeface="+mn-lt"/>
+                <a:ea typeface="+mn-ea"/>
+                <a:cs typeface="+mn-cs"/>
+              </a:defRPr>
+            </a:lvl1pPr>
+            <a:lvl2pPr marL="742950" indent="-285750" algn="l" defTabSz="457200" rtl="0" eaLnBrk="1" latinLnBrk="0" hangingPunct="1">
+              <a:spcBef>
+                <a:spcPct val="20000"/>
+              </a:spcBef>
+              <a:buFont typeface="Arial"/>
+              <a:buChar char="–"/>
+              <a:defRPr sz="2800" kern="1200">
+                <a:solidFill>
+                  <a:schemeClr val="tx1"/>
+                </a:solidFill>
+                <a:latin typeface="+mn-lt"/>
+                <a:ea typeface="+mn-ea"/>
+                <a:cs typeface="+mn-cs"/>
+              </a:defRPr>
+            </a:lvl2pPr>
+            <a:lvl3pPr marL="1143000" indent="-228600" algn="l" defTabSz="457200" rtl="0" eaLnBrk="1" latinLnBrk="0" hangingPunct="1">
+              <a:spcBef>
+                <a:spcPct val="20000"/>
+              </a:spcBef>
+              <a:buFont typeface="Arial"/>
+              <a:buChar char="•"/>
+              <a:defRPr sz="2400" kern="1200">
+                <a:solidFill>
+                  <a:schemeClr val="tx1"/>
+                </a:solidFill>
+                <a:latin typeface="+mn-lt"/>
+                <a:ea typeface="+mn-ea"/>
+                <a:cs typeface="+mn-cs"/>
+              </a:defRPr>
+            </a:lvl3pPr>
+            <a:lvl4pPr marL="1600200" indent="-228600" algn="l" defTabSz="457200" rtl="0" eaLnBrk="1" latinLnBrk="0" hangingPunct="1">
+              <a:spcBef>
+                <a:spcPct val="20000"/>
+              </a:spcBef>
+              <a:buFont typeface="Arial"/>
+              <a:buChar char="–"/>
+              <a:defRPr sz="2000" kern="1200">
+                <a:solidFill>
+                  <a:schemeClr val="tx1"/>
+                </a:solidFill>
+                <a:latin typeface="+mn-lt"/>
+                <a:ea typeface="+mn-ea"/>
+                <a:cs typeface="+mn-cs"/>
+              </a:defRPr>
+            </a:lvl4pPr>
+            <a:lvl5pPr marL="2057400" indent="-228600" algn="l" defTabSz="457200" rtl="0" eaLnBrk="1" latinLnBrk="0" hangingPunct="1">
+              <a:spcBef>
+                <a:spcPct val="20000"/>
+              </a:spcBef>
+              <a:buFont typeface="Arial"/>
+              <a:buChar char="»"/>
+              <a:defRPr sz="2000" kern="1200">
+                <a:solidFill>
+                  <a:schemeClr val="tx1"/>
+                </a:solidFill>
+                <a:latin typeface="+mn-lt"/>
+                <a:ea typeface="+mn-ea"/>
+                <a:cs typeface="+mn-cs"/>
+              </a:defRPr>
+            </a:lvl5pPr>
+            <a:lvl6pPr marL="2514600" indent="-228600" algn="l" defTabSz="457200" rtl="0" eaLnBrk="1" latinLnBrk="0" hangingPunct="1">
+              <a:spcBef>
+                <a:spcPct val="20000"/>
+              </a:spcBef>
+              <a:buFont typeface="Arial"/>
+              <a:buChar char="•"/>
+              <a:defRPr sz="2000" kern="1200">
+                <a:solidFill>
+                  <a:schemeClr val="tx1"/>
+                </a:solidFill>
+                <a:latin typeface="+mn-lt"/>
+                <a:ea typeface="+mn-ea"/>
+                <a:cs typeface="+mn-cs"/>
+              </a:defRPr>
+            </a:lvl6pPr>
+            <a:lvl7pPr marL="2971800" indent="-228600" algn="l" defTabSz="457200" rtl="0" eaLnBrk="1" latinLnBrk="0" hangingPunct="1">
+              <a:spcBef>
+                <a:spcPct val="20000"/>
+              </a:spcBef>
+              <a:buFont typeface="Arial"/>
+              <a:buChar char="•"/>
+              <a:defRPr sz="2000" kern="1200">
+                <a:solidFill>
+                  <a:schemeClr val="tx1"/>
+                </a:solidFill>
+                <a:latin typeface="+mn-lt"/>
+                <a:ea typeface="+mn-ea"/>
+                <a:cs typeface="+mn-cs"/>
+              </a:defRPr>
+            </a:lvl7pPr>
+            <a:lvl8pPr marL="3429000" indent="-228600" algn="l" defTabSz="457200" rtl="0" eaLnBrk="1" latinLnBrk="0" hangingPunct="1">
+              <a:spcBef>
+                <a:spcPct val="20000"/>
+              </a:spcBef>
+              <a:buFont typeface="Arial"/>
+              <a:buChar char="•"/>
+              <a:defRPr sz="2000" kern="1200">
+                <a:solidFill>
+                  <a:schemeClr val="tx1"/>
+                </a:solidFill>
+                <a:latin typeface="+mn-lt"/>
+                <a:ea typeface="+mn-ea"/>
+                <a:cs typeface="+mn-cs"/>
+              </a:defRPr>
+            </a:lvl8pPr>
+            <a:lvl9pPr marL="3886200" indent="-228600" algn="l" defTabSz="457200" rtl="0" eaLnBrk="1" latinLnBrk="0" hangingPunct="1">
+              <a:spcBef>
+                <a:spcPct val="20000"/>
+              </a:spcBef>
+              <a:buFont typeface="Arial"/>
+              <a:buChar char="•"/>
+              <a:defRPr sz="2000" kern="1200">
+                <a:solidFill>
+                  <a:schemeClr val="tx1"/>
+                </a:solidFill>
+                <a:latin typeface="+mn-lt"/>
+                <a:ea typeface="+mn-ea"/>
+                <a:cs typeface="+mn-cs"/>
+              </a:defRPr>
+            </a:lvl9pPr>
+          </a:lstStyle>
+          <a:p>
+            <a:pPr marL="0" indent="0">
+              <a:buNone/>
+            </a:pPr>
+            <a:r>
+              <a:rPr lang="en-US" sz="2700" b="1" i="1" dirty="0" smtClean="0">
+                <a:solidFill>
+                  <a:srgbClr val="236FC7"/>
+                </a:solidFill>
+              </a:rPr>
+              <a:t>http://</a:t>
+            </a:r>
+            <a:r>
+              <a:rPr lang="en-US" sz="2700" b="1" i="1" dirty="0" err="1" smtClean="0">
+                <a:solidFill>
+                  <a:srgbClr val="236FC7"/>
+                </a:solidFill>
+              </a:rPr>
+              <a:t>dsg.northeastern.edu</a:t>
+            </a:r>
+            <a:endParaRPr lang="en-US" sz="2700" b="1" i="1" dirty="0" smtClean="0">
+              <a:solidFill>
+                <a:srgbClr val="236FC7"/>
+              </a:solidFill>
+            </a:endParaRPr>
+          </a:p>
+          <a:p>
+            <a:pPr marL="0" indent="0">
+              <a:buNone/>
+            </a:pPr>
+            <a:endParaRPr lang="en-US" sz="1800" i="1" dirty="0" smtClean="0">
+              <a:solidFill>
+                <a:srgbClr val="202F3E"/>
+              </a:solidFill>
+            </a:endParaRPr>
+          </a:p>
+          <a:p>
+            <a:pPr marL="0" indent="0">
+              <a:buNone/>
+            </a:pPr>
+            <a:r>
+              <a:rPr lang="en-US" sz="2700" b="1" i="1" dirty="0">
+                <a:solidFill>
+                  <a:srgbClr val="236FC7"/>
+                </a:solidFill>
+              </a:rPr>
+              <a:t>http://</a:t>
+            </a:r>
+            <a:r>
+              <a:rPr lang="en-US" sz="2700" b="1" i="1" dirty="0" smtClean="0">
+                <a:solidFill>
+                  <a:srgbClr val="236FC7"/>
+                </a:solidFill>
+              </a:rPr>
+              <a:t>dsg.neu.edu/drs-project-toolkit</a:t>
+            </a:r>
+          </a:p>
+          <a:p>
+            <a:pPr marL="0" indent="0">
+              <a:buNone/>
+            </a:pPr>
+            <a:endParaRPr lang="en-US" sz="1800" i="1" dirty="0" smtClean="0">
+              <a:solidFill>
+                <a:srgbClr val="202F3E"/>
+              </a:solidFill>
+            </a:endParaRPr>
+          </a:p>
+          <a:p>
+            <a:pPr marL="0" indent="0">
+              <a:buNone/>
+            </a:pPr>
+            <a:r>
+              <a:rPr lang="en-US" sz="2700" i="1" dirty="0" err="1" smtClean="0">
+                <a:solidFill>
+                  <a:srgbClr val="26374B"/>
+                </a:solidFill>
+              </a:rPr>
+              <a:t>sj.sweeney@</a:t>
+            </a:r>
+            <a:r>
+              <a:rPr lang="en-US" sz="2700" i="1" dirty="0" err="1">
+                <a:solidFill>
+                  <a:srgbClr val="26374B"/>
+                </a:solidFill>
+              </a:rPr>
+              <a:t>neu.edu</a:t>
+            </a:r>
+            <a:endParaRPr lang="en-US" sz="2700" i="1" dirty="0">
+              <a:solidFill>
+                <a:srgbClr val="26374B"/>
+              </a:solidFill>
+            </a:endParaRPr>
+          </a:p>
+        </p:txBody>
+      </p:sp>
+    </p:spTree>
+    <p:extLst>
+      <p:ext uri="{BB962C8B-B14F-4D97-AF65-F5344CB8AC3E}">
+        <p14:creationId xmlns:p14="http://schemas.microsoft.com/office/powerpoint/2010/main" val="474705620"/>
+      </p:ext>
+    </p:extLst>
+  </p:cSld>
+  <p:clrMapOvr>
+    <a:masterClrMapping/>
+  </p:clrMapOvr>
+  <p:timing>
+    <p:tnLst>
+      <p:par>
+        <p:cTn id="1" dur="indefinite" restart="never" nodeType="tmRoot"/>
+      </p:par>
+    </p:tnLst>
+  </p:timing>
+</p:sld>
+</file>
+
 <file path=ppt/slides/slide2.xml><?xml version="1.0" encoding="utf-8"?>
 <p:sld xmlns:a="http://schemas.openxmlformats.org/drawingml/2006/main" xmlns:r="http://schemas.openxmlformats.org/officeDocument/2006/relationships" xmlns:p="http://schemas.openxmlformats.org/presentationml/2006/main">
   <p:cSld>
@@ -4446,693 +5932,6 @@
 </file>
 
 <file path=ppt/slides/slide5.xml><?xml version="1.0" encoding="utf-8"?>
-<p:sld xmlns:a="http://schemas.openxmlformats.org/drawingml/2006/main" xmlns:r="http://schemas.openxmlformats.org/officeDocument/2006/relationships" xmlns:p="http://schemas.openxmlformats.org/presentationml/2006/main">
-  <p:cSld>
-    <p:spTree>
-      <p:nvGrpSpPr>
-        <p:cNvPr id="1" name=""/>
-        <p:cNvGrpSpPr/>
-        <p:nvPr/>
-      </p:nvGrpSpPr>
-      <p:grpSpPr>
-        <a:xfrm>
-          <a:off x="0" y="0"/>
-          <a:ext cx="0" cy="0"/>
-          <a:chOff x="0" y="0"/>
-          <a:chExt cx="0" cy="0"/>
-        </a:xfrm>
-      </p:grpSpPr>
-      <p:sp>
-        <p:nvSpPr>
-          <p:cNvPr id="2" name="Title 1"/>
-          <p:cNvSpPr>
-            <a:spLocks noGrp="1"/>
-          </p:cNvSpPr>
-          <p:nvPr>
-            <p:ph type="title"/>
-          </p:nvPr>
-        </p:nvSpPr>
-        <p:spPr/>
-        <p:txBody>
-          <a:bodyPr/>
-          <a:lstStyle/>
-          <a:p>
-            <a:r>
-              <a:rPr lang="en-US" dirty="0" smtClean="0">
-                <a:solidFill>
-                  <a:srgbClr val="26374B"/>
-                </a:solidFill>
-              </a:rPr>
-              <a:t>Sites</a:t>
-            </a:r>
-            <a:endParaRPr lang="en-US" dirty="0">
-              <a:solidFill>
-                <a:srgbClr val="26374B"/>
-              </a:solidFill>
-            </a:endParaRPr>
-          </a:p>
-        </p:txBody>
-      </p:sp>
-      <p:sp>
-        <p:nvSpPr>
-          <p:cNvPr id="3" name="Content Placeholder 2"/>
-          <p:cNvSpPr>
-            <a:spLocks noGrp="1"/>
-          </p:cNvSpPr>
-          <p:nvPr>
-            <p:ph idx="1"/>
-          </p:nvPr>
-        </p:nvSpPr>
-        <p:spPr>
-          <a:xfrm>
-            <a:off x="228600" y="1384300"/>
-            <a:ext cx="8686800" cy="2857500"/>
-          </a:xfrm>
-        </p:spPr>
-        <p:txBody>
-          <a:bodyPr>
-            <a:normAutofit fontScale="92500"/>
-          </a:bodyPr>
-          <a:lstStyle/>
-          <a:p>
-            <a:pPr marL="0" indent="0" algn="ctr">
-              <a:buNone/>
-            </a:pPr>
-            <a:r>
-              <a:rPr lang="en-US" b="1" dirty="0">
-                <a:solidFill>
-                  <a:srgbClr val="26374B"/>
-                </a:solidFill>
-              </a:rPr>
-              <a:t>Live </a:t>
-            </a:r>
-            <a:r>
-              <a:rPr lang="en-US" b="1" dirty="0" smtClean="0">
-                <a:solidFill>
-                  <a:srgbClr val="26374B"/>
-                </a:solidFill>
-              </a:rPr>
-              <a:t>Sites</a:t>
-            </a:r>
-          </a:p>
-          <a:p>
-            <a:pPr marL="0" indent="0" algn="ctr">
-              <a:buNone/>
-            </a:pPr>
-            <a:r>
-              <a:rPr lang="en-US" b="1" dirty="0" smtClean="0">
-                <a:solidFill>
-                  <a:srgbClr val="236FC7"/>
-                </a:solidFill>
-              </a:rPr>
-              <a:t>http</a:t>
-            </a:r>
-            <a:r>
-              <a:rPr lang="en-US" b="1" dirty="0">
-                <a:solidFill>
-                  <a:srgbClr val="236FC7"/>
-                </a:solidFill>
-              </a:rPr>
-              <a:t>://</a:t>
-            </a:r>
-            <a:r>
-              <a:rPr lang="en-US" b="1" dirty="0" smtClean="0">
-                <a:solidFill>
-                  <a:srgbClr val="236FC7"/>
-                </a:solidFill>
-              </a:rPr>
-              <a:t>dsg.neu.edu/projects </a:t>
-            </a:r>
-            <a:endParaRPr lang="en-US" b="1" i="1" dirty="0" smtClean="0">
-              <a:solidFill>
-                <a:srgbClr val="236FC7"/>
-              </a:solidFill>
-            </a:endParaRPr>
-          </a:p>
-          <a:p>
-            <a:r>
-              <a:rPr lang="en-US" sz="2800" dirty="0" smtClean="0">
-                <a:solidFill>
-                  <a:srgbClr val="26374B"/>
-                </a:solidFill>
-              </a:rPr>
-              <a:t>Interviews </a:t>
-            </a:r>
-            <a:r>
-              <a:rPr lang="en-US" sz="2800" dirty="0">
-                <a:solidFill>
-                  <a:srgbClr val="26374B"/>
-                </a:solidFill>
-              </a:rPr>
-              <a:t>with Jewish Latin American Writers and </a:t>
-            </a:r>
-            <a:r>
-              <a:rPr lang="en-US" sz="2800" dirty="0" smtClean="0">
-                <a:solidFill>
-                  <a:srgbClr val="26374B"/>
-                </a:solidFill>
-              </a:rPr>
-              <a:t>Artists</a:t>
-            </a:r>
-          </a:p>
-          <a:p>
-            <a:r>
-              <a:rPr lang="en-US" sz="2800" dirty="0" smtClean="0">
-                <a:solidFill>
-                  <a:srgbClr val="26374B"/>
-                </a:solidFill>
-              </a:rPr>
-              <a:t>Picturing the World Gallery</a:t>
-            </a:r>
-          </a:p>
-          <a:p>
-            <a:r>
-              <a:rPr lang="en-US" sz="2800" dirty="0" smtClean="0">
-                <a:solidFill>
-                  <a:srgbClr val="26374B"/>
-                </a:solidFill>
-              </a:rPr>
-              <a:t>A </a:t>
-            </a:r>
-            <a:r>
-              <a:rPr lang="en-US" sz="2800" dirty="0">
-                <a:solidFill>
-                  <a:srgbClr val="26374B"/>
-                </a:solidFill>
-              </a:rPr>
-              <a:t>Proud Past: A History of Boston-</a:t>
-            </a:r>
-            <a:r>
-              <a:rPr lang="en-US" sz="2800" dirty="0" err="1">
-                <a:solidFill>
-                  <a:srgbClr val="26374B"/>
-                </a:solidFill>
-              </a:rPr>
-              <a:t>Bouvé</a:t>
-            </a:r>
-            <a:r>
-              <a:rPr lang="en-US" sz="2800" dirty="0">
-                <a:solidFill>
-                  <a:srgbClr val="26374B"/>
-                </a:solidFill>
-              </a:rPr>
-              <a:t> College, </a:t>
-            </a:r>
-            <a:r>
-              <a:rPr lang="en-US" sz="2800" dirty="0" smtClean="0">
-                <a:solidFill>
-                  <a:srgbClr val="26374B"/>
-                </a:solidFill>
-              </a:rPr>
-              <a:t>1913-1981</a:t>
-            </a:r>
-          </a:p>
-        </p:txBody>
-      </p:sp>
-      <p:sp>
-        <p:nvSpPr>
-          <p:cNvPr id="5" name="Content Placeholder 2"/>
-          <p:cNvSpPr txBox="1">
-            <a:spLocks/>
-          </p:cNvSpPr>
-          <p:nvPr/>
-        </p:nvSpPr>
-        <p:spPr>
-          <a:xfrm>
-            <a:off x="182881" y="4380989"/>
-            <a:ext cx="4859383" cy="2240279"/>
-          </a:xfrm>
-          <a:prstGeom prst="rect">
-            <a:avLst/>
-          </a:prstGeom>
-        </p:spPr>
-        <p:txBody>
-          <a:bodyPr vert="horz" lIns="91440" tIns="45720" rIns="91440" bIns="45720" rtlCol="0">
-            <a:noAutofit/>
-          </a:bodyPr>
-          <a:lstStyle>
-            <a:lvl1pPr marL="342900" indent="-342900" algn="l" defTabSz="457200" rtl="0" eaLnBrk="1" latinLnBrk="0" hangingPunct="1">
-              <a:spcBef>
-                <a:spcPct val="20000"/>
-              </a:spcBef>
-              <a:buFont typeface="Arial"/>
-              <a:buChar char="•"/>
-              <a:defRPr sz="3200" kern="1200">
-                <a:solidFill>
-                  <a:schemeClr val="tx1"/>
-                </a:solidFill>
-                <a:latin typeface="+mn-lt"/>
-                <a:ea typeface="+mn-ea"/>
-                <a:cs typeface="+mn-cs"/>
-              </a:defRPr>
-            </a:lvl1pPr>
-            <a:lvl2pPr marL="742950" indent="-285750" algn="l" defTabSz="457200" rtl="0" eaLnBrk="1" latinLnBrk="0" hangingPunct="1">
-              <a:spcBef>
-                <a:spcPct val="20000"/>
-              </a:spcBef>
-              <a:buFont typeface="Arial"/>
-              <a:buChar char="–"/>
-              <a:defRPr sz="2800" kern="1200">
-                <a:solidFill>
-                  <a:schemeClr val="tx1"/>
-                </a:solidFill>
-                <a:latin typeface="+mn-lt"/>
-                <a:ea typeface="+mn-ea"/>
-                <a:cs typeface="+mn-cs"/>
-              </a:defRPr>
-            </a:lvl2pPr>
-            <a:lvl3pPr marL="1143000" indent="-228600" algn="l" defTabSz="457200" rtl="0" eaLnBrk="1" latinLnBrk="0" hangingPunct="1">
-              <a:spcBef>
-                <a:spcPct val="20000"/>
-              </a:spcBef>
-              <a:buFont typeface="Arial"/>
-              <a:buChar char="•"/>
-              <a:defRPr sz="2400" kern="1200">
-                <a:solidFill>
-                  <a:schemeClr val="tx1"/>
-                </a:solidFill>
-                <a:latin typeface="+mn-lt"/>
-                <a:ea typeface="+mn-ea"/>
-                <a:cs typeface="+mn-cs"/>
-              </a:defRPr>
-            </a:lvl3pPr>
-            <a:lvl4pPr marL="1600200" indent="-228600" algn="l" defTabSz="457200" rtl="0" eaLnBrk="1" latinLnBrk="0" hangingPunct="1">
-              <a:spcBef>
-                <a:spcPct val="20000"/>
-              </a:spcBef>
-              <a:buFont typeface="Arial"/>
-              <a:buChar char="–"/>
-              <a:defRPr sz="2000" kern="1200">
-                <a:solidFill>
-                  <a:schemeClr val="tx1"/>
-                </a:solidFill>
-                <a:latin typeface="+mn-lt"/>
-                <a:ea typeface="+mn-ea"/>
-                <a:cs typeface="+mn-cs"/>
-              </a:defRPr>
-            </a:lvl4pPr>
-            <a:lvl5pPr marL="2057400" indent="-228600" algn="l" defTabSz="457200" rtl="0" eaLnBrk="1" latinLnBrk="0" hangingPunct="1">
-              <a:spcBef>
-                <a:spcPct val="20000"/>
-              </a:spcBef>
-              <a:buFont typeface="Arial"/>
-              <a:buChar char="»"/>
-              <a:defRPr sz="2000" kern="1200">
-                <a:solidFill>
-                  <a:schemeClr val="tx1"/>
-                </a:solidFill>
-                <a:latin typeface="+mn-lt"/>
-                <a:ea typeface="+mn-ea"/>
-                <a:cs typeface="+mn-cs"/>
-              </a:defRPr>
-            </a:lvl5pPr>
-            <a:lvl6pPr marL="2514600" indent="-228600" algn="l" defTabSz="457200" rtl="0" eaLnBrk="1" latinLnBrk="0" hangingPunct="1">
-              <a:spcBef>
-                <a:spcPct val="20000"/>
-              </a:spcBef>
-              <a:buFont typeface="Arial"/>
-              <a:buChar char="•"/>
-              <a:defRPr sz="2000" kern="1200">
-                <a:solidFill>
-                  <a:schemeClr val="tx1"/>
-                </a:solidFill>
-                <a:latin typeface="+mn-lt"/>
-                <a:ea typeface="+mn-ea"/>
-                <a:cs typeface="+mn-cs"/>
-              </a:defRPr>
-            </a:lvl6pPr>
-            <a:lvl7pPr marL="2971800" indent="-228600" algn="l" defTabSz="457200" rtl="0" eaLnBrk="1" latinLnBrk="0" hangingPunct="1">
-              <a:spcBef>
-                <a:spcPct val="20000"/>
-              </a:spcBef>
-              <a:buFont typeface="Arial"/>
-              <a:buChar char="•"/>
-              <a:defRPr sz="2000" kern="1200">
-                <a:solidFill>
-                  <a:schemeClr val="tx1"/>
-                </a:solidFill>
-                <a:latin typeface="+mn-lt"/>
-                <a:ea typeface="+mn-ea"/>
-                <a:cs typeface="+mn-cs"/>
-              </a:defRPr>
-            </a:lvl7pPr>
-            <a:lvl8pPr marL="3429000" indent="-228600" algn="l" defTabSz="457200" rtl="0" eaLnBrk="1" latinLnBrk="0" hangingPunct="1">
-              <a:spcBef>
-                <a:spcPct val="20000"/>
-              </a:spcBef>
-              <a:buFont typeface="Arial"/>
-              <a:buChar char="•"/>
-              <a:defRPr sz="2000" kern="1200">
-                <a:solidFill>
-                  <a:schemeClr val="tx1"/>
-                </a:solidFill>
-                <a:latin typeface="+mn-lt"/>
-                <a:ea typeface="+mn-ea"/>
-                <a:cs typeface="+mn-cs"/>
-              </a:defRPr>
-            </a:lvl8pPr>
-            <a:lvl9pPr marL="3886200" indent="-228600" algn="l" defTabSz="457200" rtl="0" eaLnBrk="1" latinLnBrk="0" hangingPunct="1">
-              <a:spcBef>
-                <a:spcPct val="20000"/>
-              </a:spcBef>
-              <a:buFont typeface="Arial"/>
-              <a:buChar char="•"/>
-              <a:defRPr sz="2000" kern="1200">
-                <a:solidFill>
-                  <a:schemeClr val="tx1"/>
-                </a:solidFill>
-                <a:latin typeface="+mn-lt"/>
-                <a:ea typeface="+mn-ea"/>
-                <a:cs typeface="+mn-cs"/>
-              </a:defRPr>
-            </a:lvl9pPr>
-          </a:lstStyle>
-          <a:p>
-            <a:pPr marL="0" indent="0" algn="ctr">
-              <a:buFont typeface="Arial"/>
-              <a:buNone/>
-            </a:pPr>
-            <a:r>
-              <a:rPr lang="en-US" sz="1700" b="1" dirty="0" smtClean="0">
-                <a:solidFill>
-                  <a:srgbClr val="26374B"/>
-                </a:solidFill>
-              </a:rPr>
-              <a:t>In Development</a:t>
-            </a:r>
-          </a:p>
-          <a:p>
-            <a:r>
-              <a:rPr lang="en-US" sz="1700" dirty="0" smtClean="0">
-                <a:solidFill>
-                  <a:srgbClr val="26374B"/>
-                </a:solidFill>
-              </a:rPr>
-              <a:t>The Catskills Institute</a:t>
-            </a:r>
-          </a:p>
-          <a:p>
-            <a:r>
-              <a:rPr lang="en-US" sz="1700" dirty="0" smtClean="0">
-                <a:solidFill>
-                  <a:srgbClr val="26374B"/>
-                </a:solidFill>
-              </a:rPr>
-              <a:t>Holocaust Awareness Week Programming</a:t>
-            </a:r>
-          </a:p>
-          <a:p>
-            <a:r>
-              <a:rPr lang="en-US" sz="1700" dirty="0" smtClean="0">
-                <a:solidFill>
-                  <a:srgbClr val="26374B"/>
-                </a:solidFill>
-              </a:rPr>
-              <a:t>Spectrum Literary Magazine</a:t>
-            </a:r>
-          </a:p>
-          <a:p>
-            <a:r>
-              <a:rPr lang="en-US" sz="1700" dirty="0" smtClean="0">
-                <a:solidFill>
-                  <a:srgbClr val="26374B"/>
-                </a:solidFill>
-              </a:rPr>
-              <a:t>DMC Studios Student Work Showcase</a:t>
-            </a:r>
-          </a:p>
-          <a:p>
-            <a:r>
-              <a:rPr lang="en-US" sz="1700" dirty="0" smtClean="0">
-                <a:solidFill>
-                  <a:srgbClr val="26374B"/>
-                </a:solidFill>
-              </a:rPr>
-              <a:t>United South End Settlements</a:t>
-            </a:r>
-          </a:p>
-        </p:txBody>
-      </p:sp>
-      <p:sp>
-        <p:nvSpPr>
-          <p:cNvPr id="6" name="Content Placeholder 2"/>
-          <p:cNvSpPr txBox="1">
-            <a:spLocks/>
-          </p:cNvSpPr>
-          <p:nvPr/>
-        </p:nvSpPr>
-        <p:spPr>
-          <a:xfrm>
-            <a:off x="4572000" y="4367926"/>
-            <a:ext cx="4598128" cy="2148839"/>
-          </a:xfrm>
-          <a:prstGeom prst="rect">
-            <a:avLst/>
-          </a:prstGeom>
-        </p:spPr>
-        <p:txBody>
-          <a:bodyPr vert="horz" lIns="91440" tIns="45720" rIns="91440" bIns="45720" rtlCol="0">
-            <a:noAutofit/>
-          </a:bodyPr>
-          <a:lstStyle>
-            <a:lvl1pPr marL="342900" indent="-342900" algn="l" defTabSz="457200" rtl="0" eaLnBrk="1" latinLnBrk="0" hangingPunct="1">
-              <a:spcBef>
-                <a:spcPct val="20000"/>
-              </a:spcBef>
-              <a:buFont typeface="Arial"/>
-              <a:buChar char="•"/>
-              <a:defRPr sz="3200" kern="1200">
-                <a:solidFill>
-                  <a:schemeClr val="tx1"/>
-                </a:solidFill>
-                <a:latin typeface="+mn-lt"/>
-                <a:ea typeface="+mn-ea"/>
-                <a:cs typeface="+mn-cs"/>
-              </a:defRPr>
-            </a:lvl1pPr>
-            <a:lvl2pPr marL="742950" indent="-285750" algn="l" defTabSz="457200" rtl="0" eaLnBrk="1" latinLnBrk="0" hangingPunct="1">
-              <a:spcBef>
-                <a:spcPct val="20000"/>
-              </a:spcBef>
-              <a:buFont typeface="Arial"/>
-              <a:buChar char="–"/>
-              <a:defRPr sz="2800" kern="1200">
-                <a:solidFill>
-                  <a:schemeClr val="tx1"/>
-                </a:solidFill>
-                <a:latin typeface="+mn-lt"/>
-                <a:ea typeface="+mn-ea"/>
-                <a:cs typeface="+mn-cs"/>
-              </a:defRPr>
-            </a:lvl2pPr>
-            <a:lvl3pPr marL="1143000" indent="-228600" algn="l" defTabSz="457200" rtl="0" eaLnBrk="1" latinLnBrk="0" hangingPunct="1">
-              <a:spcBef>
-                <a:spcPct val="20000"/>
-              </a:spcBef>
-              <a:buFont typeface="Arial"/>
-              <a:buChar char="•"/>
-              <a:defRPr sz="2400" kern="1200">
-                <a:solidFill>
-                  <a:schemeClr val="tx1"/>
-                </a:solidFill>
-                <a:latin typeface="+mn-lt"/>
-                <a:ea typeface="+mn-ea"/>
-                <a:cs typeface="+mn-cs"/>
-              </a:defRPr>
-            </a:lvl3pPr>
-            <a:lvl4pPr marL="1600200" indent="-228600" algn="l" defTabSz="457200" rtl="0" eaLnBrk="1" latinLnBrk="0" hangingPunct="1">
-              <a:spcBef>
-                <a:spcPct val="20000"/>
-              </a:spcBef>
-              <a:buFont typeface="Arial"/>
-              <a:buChar char="–"/>
-              <a:defRPr sz="2000" kern="1200">
-                <a:solidFill>
-                  <a:schemeClr val="tx1"/>
-                </a:solidFill>
-                <a:latin typeface="+mn-lt"/>
-                <a:ea typeface="+mn-ea"/>
-                <a:cs typeface="+mn-cs"/>
-              </a:defRPr>
-            </a:lvl4pPr>
-            <a:lvl5pPr marL="2057400" indent="-228600" algn="l" defTabSz="457200" rtl="0" eaLnBrk="1" latinLnBrk="0" hangingPunct="1">
-              <a:spcBef>
-                <a:spcPct val="20000"/>
-              </a:spcBef>
-              <a:buFont typeface="Arial"/>
-              <a:buChar char="»"/>
-              <a:defRPr sz="2000" kern="1200">
-                <a:solidFill>
-                  <a:schemeClr val="tx1"/>
-                </a:solidFill>
-                <a:latin typeface="+mn-lt"/>
-                <a:ea typeface="+mn-ea"/>
-                <a:cs typeface="+mn-cs"/>
-              </a:defRPr>
-            </a:lvl5pPr>
-            <a:lvl6pPr marL="2514600" indent="-228600" algn="l" defTabSz="457200" rtl="0" eaLnBrk="1" latinLnBrk="0" hangingPunct="1">
-              <a:spcBef>
-                <a:spcPct val="20000"/>
-              </a:spcBef>
-              <a:buFont typeface="Arial"/>
-              <a:buChar char="•"/>
-              <a:defRPr sz="2000" kern="1200">
-                <a:solidFill>
-                  <a:schemeClr val="tx1"/>
-                </a:solidFill>
-                <a:latin typeface="+mn-lt"/>
-                <a:ea typeface="+mn-ea"/>
-                <a:cs typeface="+mn-cs"/>
-              </a:defRPr>
-            </a:lvl6pPr>
-            <a:lvl7pPr marL="2971800" indent="-228600" algn="l" defTabSz="457200" rtl="0" eaLnBrk="1" latinLnBrk="0" hangingPunct="1">
-              <a:spcBef>
-                <a:spcPct val="20000"/>
-              </a:spcBef>
-              <a:buFont typeface="Arial"/>
-              <a:buChar char="•"/>
-              <a:defRPr sz="2000" kern="1200">
-                <a:solidFill>
-                  <a:schemeClr val="tx1"/>
-                </a:solidFill>
-                <a:latin typeface="+mn-lt"/>
-                <a:ea typeface="+mn-ea"/>
-                <a:cs typeface="+mn-cs"/>
-              </a:defRPr>
-            </a:lvl7pPr>
-            <a:lvl8pPr marL="3429000" indent="-228600" algn="l" defTabSz="457200" rtl="0" eaLnBrk="1" latinLnBrk="0" hangingPunct="1">
-              <a:spcBef>
-                <a:spcPct val="20000"/>
-              </a:spcBef>
-              <a:buFont typeface="Arial"/>
-              <a:buChar char="•"/>
-              <a:defRPr sz="2000" kern="1200">
-                <a:solidFill>
-                  <a:schemeClr val="tx1"/>
-                </a:solidFill>
-                <a:latin typeface="+mn-lt"/>
-                <a:ea typeface="+mn-ea"/>
-                <a:cs typeface="+mn-cs"/>
-              </a:defRPr>
-            </a:lvl8pPr>
-            <a:lvl9pPr marL="3886200" indent="-228600" algn="l" defTabSz="457200" rtl="0" eaLnBrk="1" latinLnBrk="0" hangingPunct="1">
-              <a:spcBef>
-                <a:spcPct val="20000"/>
-              </a:spcBef>
-              <a:buFont typeface="Arial"/>
-              <a:buChar char="•"/>
-              <a:defRPr sz="2000" kern="1200">
-                <a:solidFill>
-                  <a:schemeClr val="tx1"/>
-                </a:solidFill>
-                <a:latin typeface="+mn-lt"/>
-                <a:ea typeface="+mn-ea"/>
-                <a:cs typeface="+mn-cs"/>
-              </a:defRPr>
-            </a:lvl9pPr>
-          </a:lstStyle>
-          <a:p>
-            <a:pPr marL="0" indent="0" algn="ctr">
-              <a:buFont typeface="Arial"/>
-              <a:buNone/>
-            </a:pPr>
-            <a:r>
-              <a:rPr lang="en-US" sz="1700" b="1" dirty="0" smtClean="0">
-                <a:solidFill>
-                  <a:srgbClr val="26374B"/>
-                </a:solidFill>
-              </a:rPr>
-              <a:t>New Projects Projected for 2016</a:t>
-            </a:r>
-          </a:p>
-          <a:p>
-            <a:r>
-              <a:rPr lang="en-US" sz="1700" dirty="0" smtClean="0">
-                <a:solidFill>
-                  <a:srgbClr val="26374B"/>
-                </a:solidFill>
-              </a:rPr>
-              <a:t>Dominican Prayer Book</a:t>
-            </a:r>
-          </a:p>
-          <a:p>
-            <a:r>
-              <a:rPr lang="en-US" sz="1700" dirty="0" smtClean="0">
-                <a:solidFill>
-                  <a:srgbClr val="26374B"/>
-                </a:solidFill>
-              </a:rPr>
-              <a:t>The Civil Rights and Restorative Justice Project</a:t>
-            </a:r>
-          </a:p>
-          <a:p>
-            <a:r>
-              <a:rPr lang="en-US" sz="1700" dirty="0" smtClean="0">
-                <a:solidFill>
-                  <a:srgbClr val="26374B"/>
-                </a:solidFill>
-              </a:rPr>
-              <a:t>The Early Black Boston Digital Almanac </a:t>
-            </a:r>
-          </a:p>
-          <a:p>
-            <a:r>
-              <a:rPr lang="en-US" sz="1700" dirty="0" smtClean="0">
-                <a:solidFill>
-                  <a:srgbClr val="26374B"/>
-                </a:solidFill>
-              </a:rPr>
-              <a:t>The Early Caribbean Digital Archive</a:t>
-            </a:r>
-          </a:p>
-          <a:p>
-            <a:r>
-              <a:rPr lang="en-US" sz="1700" dirty="0" smtClean="0">
-                <a:solidFill>
-                  <a:srgbClr val="26374B"/>
-                </a:solidFill>
-              </a:rPr>
-              <a:t>African American Institute Archives</a:t>
-            </a:r>
-          </a:p>
-          <a:p>
-            <a:r>
-              <a:rPr lang="en-US" sz="1700" dirty="0" smtClean="0">
-                <a:solidFill>
-                  <a:srgbClr val="26374B"/>
-                </a:solidFill>
-              </a:rPr>
-              <a:t>Thoreau’s Journal Drawings</a:t>
-            </a:r>
-            <a:endParaRPr lang="en-US" sz="1700" dirty="0">
-              <a:solidFill>
-                <a:srgbClr val="26374B"/>
-              </a:solidFill>
-            </a:endParaRPr>
-          </a:p>
-        </p:txBody>
-      </p:sp>
-    </p:spTree>
-    <p:extLst>
-      <p:ext uri="{BB962C8B-B14F-4D97-AF65-F5344CB8AC3E}">
-        <p14:creationId xmlns:p14="http://schemas.microsoft.com/office/powerpoint/2010/main" val="185033428"/>
-      </p:ext>
-    </p:extLst>
-  </p:cSld>
-  <p:clrMapOvr>
-    <a:masterClrMapping/>
-  </p:clrMapOvr>
-  <p:timing>
-    <p:tnLst>
-      <p:par>
-        <p:cTn id="1" dur="indefinite" restart="never" nodeType="tmRoot"/>
-      </p:par>
-    </p:tnLst>
-  </p:timing>
-</p:sld>
-</file>
-
-<file path=ppt/slides/slide6.xml><?xml version="1.0" encoding="utf-8"?>
 <p:sld xmlns:a="http://schemas.openxmlformats.org/drawingml/2006/main" xmlns:r="http://schemas.openxmlformats.org/officeDocument/2006/relationships" xmlns:p="http://schemas.openxmlformats.org/presentationml/2006/main">
   <p:cSld>
     <p:spTree>
@@ -5493,6 +6292,85 @@
 </p:sld>
 </file>
 
+<file path=ppt/slides/slide6.xml><?xml version="1.0" encoding="utf-8"?>
+<p:sld xmlns:a="http://schemas.openxmlformats.org/drawingml/2006/main" xmlns:r="http://schemas.openxmlformats.org/officeDocument/2006/relationships" xmlns:p="http://schemas.openxmlformats.org/presentationml/2006/main">
+  <p:cSld>
+    <p:spTree>
+      <p:nvGrpSpPr>
+        <p:cNvPr id="1" name=""/>
+        <p:cNvGrpSpPr/>
+        <p:nvPr/>
+      </p:nvGrpSpPr>
+      <p:grpSpPr>
+        <a:xfrm>
+          <a:off x="0" y="0"/>
+          <a:ext cx="0" cy="0"/>
+          <a:chOff x="0" y="0"/>
+          <a:chExt cx="0" cy="0"/>
+        </a:xfrm>
+      </p:grpSpPr>
+      <p:sp>
+        <p:nvSpPr>
+          <p:cNvPr id="2" name="Title 1"/>
+          <p:cNvSpPr>
+            <a:spLocks noGrp="1"/>
+          </p:cNvSpPr>
+          <p:nvPr>
+            <p:ph type="title"/>
+          </p:nvPr>
+        </p:nvSpPr>
+        <p:spPr/>
+        <p:txBody>
+          <a:bodyPr/>
+          <a:lstStyle/>
+          <a:p>
+            <a:r>
+              <a:rPr lang="en-US" dirty="0" smtClean="0"/>
+              <a:t>Searching and Browsing</a:t>
+            </a:r>
+            <a:endParaRPr lang="en-US" dirty="0"/>
+          </a:p>
+        </p:txBody>
+      </p:sp>
+      <p:sp>
+        <p:nvSpPr>
+          <p:cNvPr id="3" name="Content Placeholder 2"/>
+          <p:cNvSpPr>
+            <a:spLocks noGrp="1"/>
+          </p:cNvSpPr>
+          <p:nvPr>
+            <p:ph idx="1"/>
+          </p:nvPr>
+        </p:nvSpPr>
+        <p:spPr/>
+        <p:txBody>
+          <a:bodyPr/>
+          <a:lstStyle/>
+          <a:p>
+            <a:endParaRPr lang="en-US"/>
+          </a:p>
+        </p:txBody>
+      </p:sp>
+    </p:spTree>
+    <p:extLst>
+      <p:ext uri="{BB962C8B-B14F-4D97-AF65-F5344CB8AC3E}">
+        <p14:creationId xmlns:p14="http://schemas.microsoft.com/office/powerpoint/2010/main" val="449519735"/>
+      </p:ext>
+    </p:extLst>
+  </p:cSld>
+  <p:clrMapOvr>
+    <a:masterClrMapping/>
+  </p:clrMapOvr>
+  <p:timing>
+    <p:tnLst>
+      <p:par>
+        <p:cTn id="1" dur="indefinite" restart="never" nodeType="tmRoot"/>
+      </p:par>
+    </p:tnLst>
+  </p:timing>
+</p:sld>
+</file>
+
 <file path=ppt/slides/slide7.xml><?xml version="1.0" encoding="utf-8"?>
 <p:sld xmlns:a="http://schemas.openxmlformats.org/drawingml/2006/main" xmlns:r="http://schemas.openxmlformats.org/officeDocument/2006/relationships" xmlns:p="http://schemas.openxmlformats.org/presentationml/2006/main">
   <p:cSld>
@@ -5510,688 +6388,210 @@
           <a:chExt cx="0" cy="0"/>
         </a:xfrm>
       </p:grpSpPr>
-      <p:pic>
-        <p:nvPicPr>
-          <p:cNvPr id="10" name="Picture 9" descr="DRS.png"/>
-          <p:cNvPicPr>
-            <a:picLocks noChangeAspect="1"/>
-          </p:cNvPicPr>
-          <p:nvPr/>
-        </p:nvPicPr>
-        <p:blipFill>
-          <a:blip r:embed="rId3">
-            <a:extLst>
-              <a:ext uri="{28A0092B-C50C-407E-A947-70E740481C1C}">
-                <a14:useLocalDpi xmlns:a14="http://schemas.microsoft.com/office/drawing/2010/main" val="0"/>
-              </a:ext>
-            </a:extLst>
-          </a:blip>
-          <a:stretch>
-            <a:fillRect/>
-          </a:stretch>
-        </p:blipFill>
-        <p:spPr>
-          <a:xfrm>
-            <a:off x="7471" y="5764295"/>
-            <a:ext cx="5401087" cy="662129"/>
-          </a:xfrm>
-          <a:prstGeom prst="rect">
-            <a:avLst/>
-          </a:prstGeom>
-          <a:ln>
-            <a:noFill/>
-          </a:ln>
-        </p:spPr>
-      </p:pic>
-      <p:sp>
-        <p:nvSpPr>
-          <p:cNvPr id="11" name="TextBox 10"/>
-          <p:cNvSpPr txBox="1"/>
-          <p:nvPr/>
-        </p:nvSpPr>
-        <p:spPr>
-          <a:xfrm>
-            <a:off x="-209643" y="6222144"/>
-            <a:ext cx="5139765" cy="665740"/>
-          </a:xfrm>
-          <a:prstGeom prst="rect">
-            <a:avLst/>
-          </a:prstGeom>
-          <a:noFill/>
-          <a:ln>
-            <a:noFill/>
-          </a:ln>
-        </p:spPr>
-        <p:txBody>
-          <a:bodyPr wrap="square" lIns="329104" tIns="164551" rIns="329104" bIns="164551" numCol="1" rtlCol="0" anchor="ctr">
-            <a:spAutoFit/>
-          </a:bodyPr>
-          <a:lstStyle/>
-          <a:p>
-            <a:pPr>
-              <a:lnSpc>
-                <a:spcPct val="110000"/>
-              </a:lnSpc>
-            </a:pPr>
-            <a:r>
-              <a:rPr lang="en-US" sz="2000" dirty="0" err="1" smtClean="0">
-                <a:solidFill>
-                  <a:srgbClr val="236FC7"/>
-                </a:solidFill>
-                <a:latin typeface="Gotham Book"/>
-                <a:cs typeface="Gotham Book"/>
-              </a:rPr>
-              <a:t>repository.library.northeastern.edu</a:t>
-            </a:r>
-            <a:endParaRPr lang="en-US" sz="2000" dirty="0" smtClean="0">
-              <a:solidFill>
-                <a:srgbClr val="236FC7"/>
-              </a:solidFill>
-              <a:latin typeface="Gotham Book"/>
-              <a:cs typeface="Gotham Book"/>
-            </a:endParaRPr>
-          </a:p>
-        </p:txBody>
-      </p:sp>
-      <p:sp>
-        <p:nvSpPr>
-          <p:cNvPr id="4" name="TextBox 3"/>
-          <p:cNvSpPr txBox="1"/>
-          <p:nvPr/>
-        </p:nvSpPr>
-        <p:spPr>
-          <a:xfrm>
-            <a:off x="9641093" y="3743386"/>
-            <a:ext cx="184666" cy="369332"/>
-          </a:xfrm>
-          <a:prstGeom prst="rect">
-            <a:avLst/>
-          </a:prstGeom>
-          <a:noFill/>
-        </p:spPr>
-        <p:txBody>
-          <a:bodyPr wrap="none" rtlCol="0">
-            <a:spAutoFit/>
-          </a:bodyPr>
-          <a:lstStyle/>
-          <a:p>
+      <p:sp>
+        <p:nvSpPr>
+          <p:cNvPr id="2" name="Title 1"/>
+          <p:cNvSpPr>
+            <a:spLocks noGrp="1"/>
+          </p:cNvSpPr>
+          <p:nvPr>
+            <p:ph type="title"/>
+          </p:nvPr>
+        </p:nvSpPr>
+        <p:spPr/>
+        <p:txBody>
+          <a:bodyPr/>
+          <a:lstStyle/>
+          <a:p>
+            <a:r>
+              <a:rPr lang="en-US" dirty="0" smtClean="0"/>
+              <a:t>Custom Gallery</a:t>
+            </a:r>
             <a:endParaRPr lang="en-US" dirty="0"/>
           </a:p>
         </p:txBody>
       </p:sp>
       <p:sp>
         <p:nvSpPr>
-          <p:cNvPr id="9" name="TextBox 8"/>
-          <p:cNvSpPr txBox="1"/>
-          <p:nvPr/>
-        </p:nvSpPr>
-        <p:spPr>
-          <a:xfrm>
-            <a:off x="5602942" y="5848195"/>
-            <a:ext cx="3772646" cy="1039689"/>
-          </a:xfrm>
-          <a:prstGeom prst="rect">
-            <a:avLst/>
-          </a:prstGeom>
-          <a:noFill/>
-          <a:ln>
-            <a:noFill/>
-          </a:ln>
-        </p:spPr>
-        <p:txBody>
-          <a:bodyPr wrap="square" lIns="329104" tIns="164551" rIns="329104" bIns="164551" numCol="1" rtlCol="0" anchor="ctr">
-            <a:spAutoFit/>
-          </a:bodyPr>
-          <a:lstStyle/>
-          <a:p>
-            <a:pPr algn="r">
-              <a:lnSpc>
-                <a:spcPct val="110000"/>
-              </a:lnSpc>
-            </a:pPr>
-            <a:r>
-              <a:rPr lang="en-US" sz="1400" dirty="0" smtClean="0">
-                <a:solidFill>
-                  <a:srgbClr val="26374B"/>
-                </a:solidFill>
-                <a:latin typeface="Gotham Book"/>
-                <a:cs typeface="Gotham Book"/>
-              </a:rPr>
-              <a:t>Sarah Sweeney</a:t>
-            </a:r>
-          </a:p>
-          <a:p>
-            <a:pPr algn="r">
-              <a:lnSpc>
-                <a:spcPct val="110000"/>
-              </a:lnSpc>
-            </a:pPr>
-            <a:r>
-              <a:rPr lang="en-US" sz="1400" dirty="0" smtClean="0">
-                <a:solidFill>
-                  <a:srgbClr val="26374B"/>
-                </a:solidFill>
-                <a:latin typeface="Gotham Book"/>
-                <a:cs typeface="Gotham Book"/>
-              </a:rPr>
-              <a:t>Digital Repository Manager</a:t>
-            </a:r>
-          </a:p>
-          <a:p>
-            <a:pPr algn="r">
-              <a:lnSpc>
-                <a:spcPct val="110000"/>
-              </a:lnSpc>
-            </a:pPr>
-            <a:r>
-              <a:rPr lang="en-US" sz="1400" dirty="0" smtClean="0">
-                <a:solidFill>
-                  <a:srgbClr val="26374B"/>
-                </a:solidFill>
-                <a:latin typeface="Gotham Book"/>
-                <a:cs typeface="Gotham Book"/>
-              </a:rPr>
-              <a:t>Northeastern University Library</a:t>
-            </a:r>
-            <a:endParaRPr lang="en-US" sz="1400" dirty="0">
-              <a:solidFill>
-                <a:srgbClr val="26374B"/>
-              </a:solidFill>
-              <a:latin typeface="Gotham Book"/>
-              <a:cs typeface="Gotham Book"/>
-            </a:endParaRPr>
-          </a:p>
-        </p:txBody>
-      </p:sp>
-      <p:sp>
-        <p:nvSpPr>
-          <p:cNvPr id="7" name="Subtitle 2"/>
-          <p:cNvSpPr txBox="1">
-            <a:spLocks/>
-          </p:cNvSpPr>
-          <p:nvPr/>
-        </p:nvSpPr>
-        <p:spPr>
-          <a:xfrm>
-            <a:off x="218043" y="1829059"/>
-            <a:ext cx="2145492" cy="2178560"/>
-          </a:xfrm>
-          <a:prstGeom prst="rect">
-            <a:avLst/>
-          </a:prstGeom>
-        </p:spPr>
-        <p:txBody>
-          <a:bodyPr vert="horz" lIns="91440" tIns="45720" rIns="91440" bIns="45720" rtlCol="0">
-            <a:noAutofit/>
-          </a:bodyPr>
-          <a:lstStyle>
-            <a:lvl1pPr marL="0" indent="0" algn="ctr" defTabSz="457200" rtl="0" eaLnBrk="1" latinLnBrk="0" hangingPunct="1">
-              <a:spcBef>
-                <a:spcPct val="20000"/>
-              </a:spcBef>
-              <a:buFont typeface="Arial"/>
-              <a:buNone/>
-              <a:defRPr sz="3200" kern="1200">
-                <a:solidFill>
-                  <a:schemeClr val="tx1">
-                    <a:tint val="75000"/>
-                  </a:schemeClr>
-                </a:solidFill>
-                <a:latin typeface="+mn-lt"/>
-                <a:ea typeface="+mn-ea"/>
-                <a:cs typeface="+mn-cs"/>
-              </a:defRPr>
-            </a:lvl1pPr>
-            <a:lvl2pPr marL="457200" indent="0" algn="ctr" defTabSz="457200" rtl="0" eaLnBrk="1" latinLnBrk="0" hangingPunct="1">
-              <a:spcBef>
-                <a:spcPct val="20000"/>
-              </a:spcBef>
-              <a:buFont typeface="Arial"/>
-              <a:buNone/>
-              <a:defRPr sz="2800" kern="1200">
-                <a:solidFill>
-                  <a:schemeClr val="tx1">
-                    <a:tint val="75000"/>
-                  </a:schemeClr>
-                </a:solidFill>
-                <a:latin typeface="+mn-lt"/>
-                <a:ea typeface="+mn-ea"/>
-                <a:cs typeface="+mn-cs"/>
-              </a:defRPr>
-            </a:lvl2pPr>
-            <a:lvl3pPr marL="914400" indent="0" algn="ctr" defTabSz="457200" rtl="0" eaLnBrk="1" latinLnBrk="0" hangingPunct="1">
-              <a:spcBef>
-                <a:spcPct val="20000"/>
-              </a:spcBef>
-              <a:buFont typeface="Arial"/>
-              <a:buNone/>
-              <a:defRPr sz="2400" kern="1200">
-                <a:solidFill>
-                  <a:schemeClr val="tx1">
-                    <a:tint val="75000"/>
-                  </a:schemeClr>
-                </a:solidFill>
-                <a:latin typeface="+mn-lt"/>
-                <a:ea typeface="+mn-ea"/>
-                <a:cs typeface="+mn-cs"/>
-              </a:defRPr>
-            </a:lvl3pPr>
-            <a:lvl4pPr marL="1371600" indent="0" algn="ctr" defTabSz="457200" rtl="0" eaLnBrk="1" latinLnBrk="0" hangingPunct="1">
-              <a:spcBef>
-                <a:spcPct val="20000"/>
-              </a:spcBef>
-              <a:buFont typeface="Arial"/>
-              <a:buNone/>
-              <a:defRPr sz="2000" kern="1200">
-                <a:solidFill>
-                  <a:schemeClr val="tx1">
-                    <a:tint val="75000"/>
-                  </a:schemeClr>
-                </a:solidFill>
-                <a:latin typeface="+mn-lt"/>
-                <a:ea typeface="+mn-ea"/>
-                <a:cs typeface="+mn-cs"/>
-              </a:defRPr>
-            </a:lvl4pPr>
-            <a:lvl5pPr marL="1828800" indent="0" algn="ctr" defTabSz="457200" rtl="0" eaLnBrk="1" latinLnBrk="0" hangingPunct="1">
-              <a:spcBef>
-                <a:spcPct val="20000"/>
-              </a:spcBef>
-              <a:buFont typeface="Arial"/>
-              <a:buNone/>
-              <a:defRPr sz="2000" kern="1200">
-                <a:solidFill>
-                  <a:schemeClr val="tx1">
-                    <a:tint val="75000"/>
-                  </a:schemeClr>
-                </a:solidFill>
-                <a:latin typeface="+mn-lt"/>
-                <a:ea typeface="+mn-ea"/>
-                <a:cs typeface="+mn-cs"/>
-              </a:defRPr>
-            </a:lvl5pPr>
-            <a:lvl6pPr marL="2286000" indent="0" algn="ctr" defTabSz="457200" rtl="0" eaLnBrk="1" latinLnBrk="0" hangingPunct="1">
-              <a:spcBef>
-                <a:spcPct val="20000"/>
-              </a:spcBef>
-              <a:buFont typeface="Arial"/>
-              <a:buNone/>
-              <a:defRPr sz="2000" kern="1200">
-                <a:solidFill>
-                  <a:schemeClr val="tx1">
-                    <a:tint val="75000"/>
-                  </a:schemeClr>
-                </a:solidFill>
-                <a:latin typeface="+mn-lt"/>
-                <a:ea typeface="+mn-ea"/>
-                <a:cs typeface="+mn-cs"/>
-              </a:defRPr>
-            </a:lvl6pPr>
-            <a:lvl7pPr marL="2743200" indent="0" algn="ctr" defTabSz="457200" rtl="0" eaLnBrk="1" latinLnBrk="0" hangingPunct="1">
-              <a:spcBef>
-                <a:spcPct val="20000"/>
-              </a:spcBef>
-              <a:buFont typeface="Arial"/>
-              <a:buNone/>
-              <a:defRPr sz="2000" kern="1200">
-                <a:solidFill>
-                  <a:schemeClr val="tx1">
-                    <a:tint val="75000"/>
-                  </a:schemeClr>
-                </a:solidFill>
-                <a:latin typeface="+mn-lt"/>
-                <a:ea typeface="+mn-ea"/>
-                <a:cs typeface="+mn-cs"/>
-              </a:defRPr>
-            </a:lvl7pPr>
-            <a:lvl8pPr marL="3200400" indent="0" algn="ctr" defTabSz="457200" rtl="0" eaLnBrk="1" latinLnBrk="0" hangingPunct="1">
-              <a:spcBef>
-                <a:spcPct val="20000"/>
-              </a:spcBef>
-              <a:buFont typeface="Arial"/>
-              <a:buNone/>
-              <a:defRPr sz="2000" kern="1200">
-                <a:solidFill>
-                  <a:schemeClr val="tx1">
-                    <a:tint val="75000"/>
-                  </a:schemeClr>
-                </a:solidFill>
-                <a:latin typeface="+mn-lt"/>
-                <a:ea typeface="+mn-ea"/>
-                <a:cs typeface="+mn-cs"/>
-              </a:defRPr>
-            </a:lvl8pPr>
-            <a:lvl9pPr marL="3657600" indent="0" algn="ctr" defTabSz="457200" rtl="0" eaLnBrk="1" latinLnBrk="0" hangingPunct="1">
-              <a:spcBef>
-                <a:spcPct val="20000"/>
-              </a:spcBef>
-              <a:buFont typeface="Arial"/>
-              <a:buNone/>
-              <a:defRPr sz="2000" kern="1200">
-                <a:solidFill>
-                  <a:schemeClr val="tx1">
-                    <a:tint val="75000"/>
-                  </a:schemeClr>
-                </a:solidFill>
-                <a:latin typeface="+mn-lt"/>
-                <a:ea typeface="+mn-ea"/>
-                <a:cs typeface="+mn-cs"/>
-              </a:defRPr>
-            </a:lvl9pPr>
-          </a:lstStyle>
-          <a:p>
-            <a:pPr algn="r"/>
-            <a:r>
-              <a:rPr lang="en-US" sz="2700" b="1" i="1" dirty="0" smtClean="0">
-                <a:solidFill>
-                  <a:srgbClr val="202F3E"/>
-                </a:solidFill>
-              </a:rPr>
-              <a:t>DSG</a:t>
-            </a:r>
-          </a:p>
-          <a:p>
-            <a:pPr algn="r"/>
-            <a:endParaRPr lang="en-US" sz="1800" b="1" i="1" dirty="0" smtClean="0">
-              <a:solidFill>
-                <a:srgbClr val="202F3E"/>
-              </a:solidFill>
-            </a:endParaRPr>
-          </a:p>
-          <a:p>
-            <a:pPr algn="r"/>
-            <a:r>
-              <a:rPr lang="en-US" sz="2700" b="1" i="1" dirty="0" smtClean="0">
-                <a:solidFill>
-                  <a:srgbClr val="202F3E"/>
-                </a:solidFill>
-              </a:rPr>
-              <a:t>Resources</a:t>
-            </a:r>
-          </a:p>
-          <a:p>
-            <a:pPr algn="r"/>
-            <a:endParaRPr lang="en-US" sz="1800" b="1" i="1" dirty="0" smtClean="0">
-              <a:solidFill>
-                <a:srgbClr val="202F3E"/>
-              </a:solidFill>
-            </a:endParaRPr>
-          </a:p>
-          <a:p>
-            <a:pPr algn="r"/>
-            <a:r>
-              <a:rPr lang="en-US" sz="2700" b="1" i="1" dirty="0" smtClean="0">
-                <a:solidFill>
-                  <a:srgbClr val="202F3E"/>
-                </a:solidFill>
-              </a:rPr>
-              <a:t>Contact</a:t>
-            </a:r>
-            <a:endParaRPr lang="en-US" sz="2700" b="1" i="1" dirty="0">
-              <a:solidFill>
-                <a:srgbClr val="202F3E"/>
-              </a:solidFill>
-            </a:endParaRPr>
-          </a:p>
-        </p:txBody>
-      </p:sp>
-      <p:sp>
-        <p:nvSpPr>
-          <p:cNvPr id="8" name="Subtitle 2"/>
-          <p:cNvSpPr txBox="1">
-            <a:spLocks/>
-          </p:cNvSpPr>
-          <p:nvPr/>
-        </p:nvSpPr>
-        <p:spPr>
-          <a:xfrm>
-            <a:off x="2551815" y="1829059"/>
-            <a:ext cx="6294473" cy="2178560"/>
-          </a:xfrm>
-          <a:prstGeom prst="rect">
-            <a:avLst/>
-          </a:prstGeom>
-        </p:spPr>
-        <p:txBody>
-          <a:bodyPr>
-            <a:normAutofit/>
-          </a:bodyPr>
-          <a:lstStyle>
-            <a:lvl1pPr marL="342900" indent="-342900" algn="l" defTabSz="457200" rtl="0" eaLnBrk="1" latinLnBrk="0" hangingPunct="1">
-              <a:spcBef>
-                <a:spcPct val="20000"/>
-              </a:spcBef>
-              <a:buFont typeface="Arial"/>
-              <a:buChar char="•"/>
-              <a:defRPr sz="3200" kern="1200">
-                <a:solidFill>
-                  <a:schemeClr val="tx1"/>
-                </a:solidFill>
-                <a:latin typeface="+mn-lt"/>
-                <a:ea typeface="+mn-ea"/>
-                <a:cs typeface="+mn-cs"/>
-              </a:defRPr>
-            </a:lvl1pPr>
-            <a:lvl2pPr marL="742950" indent="-285750" algn="l" defTabSz="457200" rtl="0" eaLnBrk="1" latinLnBrk="0" hangingPunct="1">
-              <a:spcBef>
-                <a:spcPct val="20000"/>
-              </a:spcBef>
-              <a:buFont typeface="Arial"/>
-              <a:buChar char="–"/>
-              <a:defRPr sz="2800" kern="1200">
-                <a:solidFill>
-                  <a:schemeClr val="tx1"/>
-                </a:solidFill>
-                <a:latin typeface="+mn-lt"/>
-                <a:ea typeface="+mn-ea"/>
-                <a:cs typeface="+mn-cs"/>
-              </a:defRPr>
-            </a:lvl2pPr>
-            <a:lvl3pPr marL="1143000" indent="-228600" algn="l" defTabSz="457200" rtl="0" eaLnBrk="1" latinLnBrk="0" hangingPunct="1">
-              <a:spcBef>
-                <a:spcPct val="20000"/>
-              </a:spcBef>
-              <a:buFont typeface="Arial"/>
-              <a:buChar char="•"/>
-              <a:defRPr sz="2400" kern="1200">
-                <a:solidFill>
-                  <a:schemeClr val="tx1"/>
-                </a:solidFill>
-                <a:latin typeface="+mn-lt"/>
-                <a:ea typeface="+mn-ea"/>
-                <a:cs typeface="+mn-cs"/>
-              </a:defRPr>
-            </a:lvl3pPr>
-            <a:lvl4pPr marL="1600200" indent="-228600" algn="l" defTabSz="457200" rtl="0" eaLnBrk="1" latinLnBrk="0" hangingPunct="1">
-              <a:spcBef>
-                <a:spcPct val="20000"/>
-              </a:spcBef>
-              <a:buFont typeface="Arial"/>
-              <a:buChar char="–"/>
-              <a:defRPr sz="2000" kern="1200">
-                <a:solidFill>
-                  <a:schemeClr val="tx1"/>
-                </a:solidFill>
-                <a:latin typeface="+mn-lt"/>
-                <a:ea typeface="+mn-ea"/>
-                <a:cs typeface="+mn-cs"/>
-              </a:defRPr>
-            </a:lvl4pPr>
-            <a:lvl5pPr marL="2057400" indent="-228600" algn="l" defTabSz="457200" rtl="0" eaLnBrk="1" latinLnBrk="0" hangingPunct="1">
-              <a:spcBef>
-                <a:spcPct val="20000"/>
-              </a:spcBef>
-              <a:buFont typeface="Arial"/>
-              <a:buChar char="»"/>
-              <a:defRPr sz="2000" kern="1200">
-                <a:solidFill>
-                  <a:schemeClr val="tx1"/>
-                </a:solidFill>
-                <a:latin typeface="+mn-lt"/>
-                <a:ea typeface="+mn-ea"/>
-                <a:cs typeface="+mn-cs"/>
-              </a:defRPr>
-            </a:lvl5pPr>
-            <a:lvl6pPr marL="2514600" indent="-228600" algn="l" defTabSz="457200" rtl="0" eaLnBrk="1" latinLnBrk="0" hangingPunct="1">
-              <a:spcBef>
-                <a:spcPct val="20000"/>
-              </a:spcBef>
-              <a:buFont typeface="Arial"/>
-              <a:buChar char="•"/>
-              <a:defRPr sz="2000" kern="1200">
-                <a:solidFill>
-                  <a:schemeClr val="tx1"/>
-                </a:solidFill>
-                <a:latin typeface="+mn-lt"/>
-                <a:ea typeface="+mn-ea"/>
-                <a:cs typeface="+mn-cs"/>
-              </a:defRPr>
-            </a:lvl6pPr>
-            <a:lvl7pPr marL="2971800" indent="-228600" algn="l" defTabSz="457200" rtl="0" eaLnBrk="1" latinLnBrk="0" hangingPunct="1">
-              <a:spcBef>
-                <a:spcPct val="20000"/>
-              </a:spcBef>
-              <a:buFont typeface="Arial"/>
-              <a:buChar char="•"/>
-              <a:defRPr sz="2000" kern="1200">
-                <a:solidFill>
-                  <a:schemeClr val="tx1"/>
-                </a:solidFill>
-                <a:latin typeface="+mn-lt"/>
-                <a:ea typeface="+mn-ea"/>
-                <a:cs typeface="+mn-cs"/>
-              </a:defRPr>
-            </a:lvl7pPr>
-            <a:lvl8pPr marL="3429000" indent="-228600" algn="l" defTabSz="457200" rtl="0" eaLnBrk="1" latinLnBrk="0" hangingPunct="1">
-              <a:spcBef>
-                <a:spcPct val="20000"/>
-              </a:spcBef>
-              <a:buFont typeface="Arial"/>
-              <a:buChar char="•"/>
-              <a:defRPr sz="2000" kern="1200">
-                <a:solidFill>
-                  <a:schemeClr val="tx1"/>
-                </a:solidFill>
-                <a:latin typeface="+mn-lt"/>
-                <a:ea typeface="+mn-ea"/>
-                <a:cs typeface="+mn-cs"/>
-              </a:defRPr>
-            </a:lvl8pPr>
-            <a:lvl9pPr marL="3886200" indent="-228600" algn="l" defTabSz="457200" rtl="0" eaLnBrk="1" latinLnBrk="0" hangingPunct="1">
-              <a:spcBef>
-                <a:spcPct val="20000"/>
-              </a:spcBef>
-              <a:buFont typeface="Arial"/>
-              <a:buChar char="•"/>
-              <a:defRPr sz="2000" kern="1200">
-                <a:solidFill>
-                  <a:schemeClr val="tx1"/>
-                </a:solidFill>
-                <a:latin typeface="+mn-lt"/>
-                <a:ea typeface="+mn-ea"/>
-                <a:cs typeface="+mn-cs"/>
-              </a:defRPr>
-            </a:lvl9pPr>
-          </a:lstStyle>
-          <a:p>
-            <a:pPr marL="0" indent="0">
-              <a:buNone/>
-            </a:pPr>
-            <a:r>
-              <a:rPr lang="en-US" sz="2700" b="1" i="1" dirty="0" smtClean="0">
-                <a:solidFill>
-                  <a:srgbClr val="236FC7"/>
-                </a:solidFill>
-              </a:rPr>
-              <a:t>http://</a:t>
-            </a:r>
-            <a:r>
-              <a:rPr lang="en-US" sz="2700" b="1" i="1" dirty="0" err="1" smtClean="0">
-                <a:solidFill>
-                  <a:srgbClr val="236FC7"/>
-                </a:solidFill>
-              </a:rPr>
-              <a:t>dsg.northeastern.edu</a:t>
-            </a:r>
-            <a:endParaRPr lang="en-US" sz="2700" b="1" i="1" dirty="0" smtClean="0">
-              <a:solidFill>
-                <a:srgbClr val="236FC7"/>
-              </a:solidFill>
-            </a:endParaRPr>
-          </a:p>
-          <a:p>
-            <a:pPr marL="0" indent="0">
-              <a:buNone/>
-            </a:pPr>
-            <a:endParaRPr lang="en-US" sz="1800" i="1" dirty="0" smtClean="0">
-              <a:solidFill>
-                <a:srgbClr val="202F3E"/>
-              </a:solidFill>
-            </a:endParaRPr>
-          </a:p>
-          <a:p>
-            <a:pPr marL="0" indent="0">
-              <a:buNone/>
-            </a:pPr>
-            <a:r>
-              <a:rPr lang="en-US" sz="2700" b="1" i="1" dirty="0">
-                <a:solidFill>
-                  <a:srgbClr val="236FC7"/>
-                </a:solidFill>
-              </a:rPr>
-              <a:t>http://</a:t>
-            </a:r>
-            <a:r>
-              <a:rPr lang="en-US" sz="2700" b="1" i="1" dirty="0" smtClean="0">
-                <a:solidFill>
-                  <a:srgbClr val="236FC7"/>
-                </a:solidFill>
-              </a:rPr>
-              <a:t>dsg.neu.edu/drs-project-toolkit</a:t>
-            </a:r>
-          </a:p>
-          <a:p>
-            <a:pPr marL="0" indent="0">
-              <a:buNone/>
-            </a:pPr>
-            <a:endParaRPr lang="en-US" sz="1800" i="1" dirty="0" smtClean="0">
-              <a:solidFill>
-                <a:srgbClr val="202F3E"/>
-              </a:solidFill>
-            </a:endParaRPr>
-          </a:p>
-          <a:p>
-            <a:pPr marL="0" indent="0">
-              <a:buNone/>
-            </a:pPr>
-            <a:r>
-              <a:rPr lang="en-US" sz="2700" i="1" dirty="0" err="1" smtClean="0">
-                <a:solidFill>
-                  <a:srgbClr val="26374B"/>
-                </a:solidFill>
-              </a:rPr>
-              <a:t>sj.sweeney@</a:t>
-            </a:r>
-            <a:r>
-              <a:rPr lang="en-US" sz="2700" i="1" dirty="0" err="1">
-                <a:solidFill>
-                  <a:srgbClr val="26374B"/>
-                </a:solidFill>
-              </a:rPr>
-              <a:t>neu.edu</a:t>
-            </a:r>
-            <a:endParaRPr lang="en-US" sz="2700" i="1" dirty="0">
-              <a:solidFill>
-                <a:srgbClr val="26374B"/>
-              </a:solidFill>
-            </a:endParaRPr>
+          <p:cNvPr id="3" name="Content Placeholder 2"/>
+          <p:cNvSpPr>
+            <a:spLocks noGrp="1"/>
+          </p:cNvSpPr>
+          <p:nvPr>
+            <p:ph idx="1"/>
+          </p:nvPr>
+        </p:nvSpPr>
+        <p:spPr/>
+        <p:txBody>
+          <a:bodyPr/>
+          <a:lstStyle/>
+          <a:p>
+            <a:endParaRPr lang="en-US"/>
           </a:p>
         </p:txBody>
       </p:sp>
     </p:spTree>
     <p:extLst>
       <p:ext uri="{BB962C8B-B14F-4D97-AF65-F5344CB8AC3E}">
-        <p14:creationId xmlns:p14="http://schemas.microsoft.com/office/powerpoint/2010/main" val="474705620"/>
+        <p14:creationId xmlns:p14="http://schemas.microsoft.com/office/powerpoint/2010/main" val="1169046193"/>
+      </p:ext>
+    </p:extLst>
+  </p:cSld>
+  <p:clrMapOvr>
+    <a:masterClrMapping/>
+  </p:clrMapOvr>
+  <p:timing>
+    <p:tnLst>
+      <p:par>
+        <p:cTn id="1" dur="indefinite" restart="never" nodeType="tmRoot"/>
+      </p:par>
+    </p:tnLst>
+  </p:timing>
+</p:sld>
+</file>
+
+<file path=ppt/slides/slide8.xml><?xml version="1.0" encoding="utf-8"?>
+<p:sld xmlns:a="http://schemas.openxmlformats.org/drawingml/2006/main" xmlns:r="http://schemas.openxmlformats.org/officeDocument/2006/relationships" xmlns:p="http://schemas.openxmlformats.org/presentationml/2006/main">
+  <p:cSld>
+    <p:spTree>
+      <p:nvGrpSpPr>
+        <p:cNvPr id="1" name=""/>
+        <p:cNvGrpSpPr/>
+        <p:nvPr/>
+      </p:nvGrpSpPr>
+      <p:grpSpPr>
+        <a:xfrm>
+          <a:off x="0" y="0"/>
+          <a:ext cx="0" cy="0"/>
+          <a:chOff x="0" y="0"/>
+          <a:chExt cx="0" cy="0"/>
+        </a:xfrm>
+      </p:grpSpPr>
+      <p:sp>
+        <p:nvSpPr>
+          <p:cNvPr id="2" name="Title 1"/>
+          <p:cNvSpPr>
+            <a:spLocks noGrp="1"/>
+          </p:cNvSpPr>
+          <p:nvPr>
+            <p:ph type="title"/>
+          </p:nvPr>
+        </p:nvSpPr>
+        <p:spPr/>
+        <p:txBody>
+          <a:bodyPr/>
+          <a:lstStyle/>
+          <a:p>
+            <a:r>
+              <a:rPr lang="en-US" dirty="0" smtClean="0"/>
+              <a:t>Playlist</a:t>
+            </a:r>
+            <a:endParaRPr lang="en-US" dirty="0"/>
+          </a:p>
+        </p:txBody>
+      </p:sp>
+      <p:sp>
+        <p:nvSpPr>
+          <p:cNvPr id="3" name="Content Placeholder 2"/>
+          <p:cNvSpPr>
+            <a:spLocks noGrp="1"/>
+          </p:cNvSpPr>
+          <p:nvPr>
+            <p:ph idx="1"/>
+          </p:nvPr>
+        </p:nvSpPr>
+        <p:spPr/>
+        <p:txBody>
+          <a:bodyPr/>
+          <a:lstStyle/>
+          <a:p>
+            <a:endParaRPr lang="en-US"/>
+          </a:p>
+        </p:txBody>
+      </p:sp>
+    </p:spTree>
+    <p:extLst>
+      <p:ext uri="{BB962C8B-B14F-4D97-AF65-F5344CB8AC3E}">
+        <p14:creationId xmlns:p14="http://schemas.microsoft.com/office/powerpoint/2010/main" val="608053552"/>
+      </p:ext>
+    </p:extLst>
+  </p:cSld>
+  <p:clrMapOvr>
+    <a:masterClrMapping/>
+  </p:clrMapOvr>
+  <p:timing>
+    <p:tnLst>
+      <p:par>
+        <p:cTn id="1" dur="indefinite" restart="never" nodeType="tmRoot"/>
+      </p:par>
+    </p:tnLst>
+  </p:timing>
+</p:sld>
+</file>
+
+<file path=ppt/slides/slide9.xml><?xml version="1.0" encoding="utf-8"?>
+<p:sld xmlns:a="http://schemas.openxmlformats.org/drawingml/2006/main" xmlns:r="http://schemas.openxmlformats.org/officeDocument/2006/relationships" xmlns:p="http://schemas.openxmlformats.org/presentationml/2006/main">
+  <p:cSld>
+    <p:spTree>
+      <p:nvGrpSpPr>
+        <p:cNvPr id="1" name=""/>
+        <p:cNvGrpSpPr/>
+        <p:nvPr/>
+      </p:nvGrpSpPr>
+      <p:grpSpPr>
+        <a:xfrm>
+          <a:off x="0" y="0"/>
+          <a:ext cx="0" cy="0"/>
+          <a:chOff x="0" y="0"/>
+          <a:chExt cx="0" cy="0"/>
+        </a:xfrm>
+      </p:grpSpPr>
+      <p:sp>
+        <p:nvSpPr>
+          <p:cNvPr id="2" name="Title 1"/>
+          <p:cNvSpPr>
+            <a:spLocks noGrp="1"/>
+          </p:cNvSpPr>
+          <p:nvPr>
+            <p:ph type="title"/>
+          </p:nvPr>
+        </p:nvSpPr>
+        <p:spPr/>
+        <p:txBody>
+          <a:bodyPr/>
+          <a:lstStyle/>
+          <a:p>
+            <a:r>
+              <a:rPr lang="en-US" dirty="0" smtClean="0"/>
+              <a:t>Map</a:t>
+            </a:r>
+            <a:endParaRPr lang="en-US" dirty="0"/>
+          </a:p>
+        </p:txBody>
+      </p:sp>
+      <p:sp>
+        <p:nvSpPr>
+          <p:cNvPr id="3" name="Content Placeholder 2"/>
+          <p:cNvSpPr>
+            <a:spLocks noGrp="1"/>
+          </p:cNvSpPr>
+          <p:nvPr>
+            <p:ph idx="1"/>
+          </p:nvPr>
+        </p:nvSpPr>
+        <p:spPr/>
+        <p:txBody>
+          <a:bodyPr/>
+          <a:lstStyle/>
+          <a:p>
+            <a:endParaRPr lang="en-US"/>
+          </a:p>
+        </p:txBody>
+      </p:sp>
+    </p:spTree>
+    <p:extLst>
+      <p:ext uri="{BB962C8B-B14F-4D97-AF65-F5344CB8AC3E}">
+        <p14:creationId xmlns:p14="http://schemas.microsoft.com/office/powerpoint/2010/main" val="871849623"/>
       </p:ext>
     </p:extLst>
   </p:cSld>

</xml_diff>